<commit_message>
Updated to week 5 slides
</commit_message>
<xml_diff>
--- a/05 Parallel programming/Threading.pptx
+++ b/05 Parallel programming/Threading.pptx
@@ -223,7 +223,7 @@
           <a:p>
             <a:fld id="{C3D45B35-5990-4A22-9246-3EAB55A12994}" type="datetimeFigureOut">
               <a:rPr lang="da-DK" smtClean="0"/>
-              <a:t>16.09.2022</a:t>
+              <a:t>26.09.2022</a:t>
             </a:fld>
             <a:endParaRPr lang="da-DK"/>
           </a:p>
@@ -8167,6 +8167,52 @@
           </a:p>
         </p:txBody>
       </p:sp>
+      <p:sp>
+        <p:nvSpPr>
+          <p:cNvPr id="5" name="TextBox 4">
+            <a:extLst>
+              <a:ext uri="{FF2B5EF4-FFF2-40B4-BE49-F238E27FC236}">
+                <a16:creationId xmlns:a16="http://schemas.microsoft.com/office/drawing/2014/main" id="{3ADFAD87-F526-EADC-54CA-DF31C2D8D0C7}"/>
+              </a:ext>
+            </a:extLst>
+          </p:cNvPr>
+          <p:cNvSpPr txBox="1"/>
+          <p:nvPr/>
+        </p:nvSpPr>
+        <p:spPr>
+          <a:xfrm>
+            <a:off x="433633" y="6146276"/>
+            <a:ext cx="9209988" cy="273378"/>
+          </a:xfrm>
+          <a:prstGeom prst="rect">
+            <a:avLst/>
+          </a:prstGeom>
+        </p:spPr>
+        <p:txBody>
+          <a:bodyPr vert="horz" wrap="square" lIns="91440" tIns="45720" rIns="91440" bIns="45720" rtlCol="0" anchor="ctr">
+            <a:normAutofit fontScale="70000" lnSpcReduction="20000"/>
+          </a:bodyPr>
+          <a:lstStyle/>
+          <a:p>
+            <a:r>
+              <a:rPr lang="en-GB" dirty="0">
+                <a:latin typeface="Gill Sans MT" panose="020B0502020104020203" pitchFamily="34" charset="0"/>
+                <a:hlinkClick r:id="rId3"/>
+              </a:rPr>
+              <a:t>https://learn.microsoft.com/en-us/dotnet/api/system.threading.thread.start?view=net-6.0#system-threading-thread-start(system-object)</a:t>
+            </a:r>
+            <a:r>
+              <a:rPr lang="en-GB" dirty="0">
+                <a:latin typeface="Gill Sans MT" panose="020B0502020104020203" pitchFamily="34" charset="0"/>
+              </a:rPr>
+              <a:t> </a:t>
+            </a:r>
+            <a:endParaRPr lang="en-DK" dirty="0">
+              <a:latin typeface="Gill Sans MT" panose="020B0502020104020203" pitchFamily="34" charset="0"/>
+            </a:endParaRPr>
+          </a:p>
+        </p:txBody>
+      </p:sp>
     </p:spTree>
     <p:extLst>
       <p:ext uri="{BB962C8B-B14F-4D97-AF65-F5344CB8AC3E}">
@@ -10185,58 +10231,6 @@
           </a:p>
         </p:txBody>
       </p:sp>
-      <p:sp>
-        <p:nvSpPr>
-          <p:cNvPr id="3" name="Content Placeholder 2"/>
-          <p:cNvSpPr>
-            <a:spLocks noGrp="1"/>
-          </p:cNvSpPr>
-          <p:nvPr>
-            <p:ph idx="1"/>
-          </p:nvPr>
-        </p:nvSpPr>
-        <p:spPr>
-          <a:xfrm>
-            <a:off x="838199" y="5891742"/>
-            <a:ext cx="10515600" cy="521230"/>
-          </a:xfrm>
-        </p:spPr>
-        <p:txBody>
-          <a:bodyPr>
-            <a:normAutofit fontScale="47500" lnSpcReduction="20000"/>
-          </a:bodyPr>
-          <a:lstStyle/>
-          <a:p>
-            <a:pPr marL="0" indent="0">
-              <a:buNone/>
-            </a:pPr>
-            <a:r>
-              <a:rPr lang="da-DK" dirty="0">
-                <a:hlinkClick r:id="rId3"/>
-              </a:rPr>
-              <a:t>https://docs.microsoft.com/en-us/dotnet/api/system.threading.thread.suspend?view=net-5.0#System_Threading_Thread_Suspend</a:t>
-            </a:r>
-          </a:p>
-          <a:p>
-            <a:pPr marL="0" indent="0">
-              <a:buNone/>
-            </a:pPr>
-            <a:r>
-              <a:rPr lang="da-DK" dirty="0">
-                <a:hlinkClick r:id="rId3"/>
-              </a:rPr>
-              <a:t>https://docs.microsoft.com/en-us/dotnet/api/system.threading.thread.resume?view=net-5.0#System_Threading_Thread_Resume</a:t>
-            </a:r>
-            <a:endParaRPr lang="da-DK" dirty="0"/>
-          </a:p>
-          <a:p>
-            <a:pPr marL="0" indent="0">
-              <a:buNone/>
-            </a:pPr>
-            <a:endParaRPr lang="da-DK" dirty="0"/>
-          </a:p>
-        </p:txBody>
-      </p:sp>
       <p:pic>
         <p:nvPicPr>
           <p:cNvPr id="4" name="Picture 3"/>
@@ -10246,7 +10240,7 @@
           <p:nvPr/>
         </p:nvPicPr>
         <p:blipFill>
-          <a:blip r:embed="rId4"/>
+          <a:blip r:embed="rId3"/>
           <a:stretch>
             <a:fillRect/>
           </a:stretch>
@@ -10270,7 +10264,7 @@
           <p:nvPr/>
         </p:nvPicPr>
         <p:blipFill>
-          <a:blip r:embed="rId5"/>
+          <a:blip r:embed="rId4"/>
           <a:stretch>
             <a:fillRect/>
           </a:stretch>
@@ -10308,7 +10302,63 @@
           <a:p>
             <a:endParaRPr lang="da-DK" sz="1600" dirty="0">
               <a:latin typeface="Gill Sans MT" panose="020B0502020104020203" pitchFamily="34" charset="0"/>
-              <a:hlinkClick r:id="rId6"/>
+              <a:hlinkClick r:id="rId5"/>
+            </a:endParaRPr>
+          </a:p>
+        </p:txBody>
+      </p:sp>
+      <p:sp>
+        <p:nvSpPr>
+          <p:cNvPr id="9" name="TextBox 8">
+            <a:extLst>
+              <a:ext uri="{FF2B5EF4-FFF2-40B4-BE49-F238E27FC236}">
+                <a16:creationId xmlns:a16="http://schemas.microsoft.com/office/drawing/2014/main" id="{499D4E07-45BE-51A0-6F0D-E0042C831052}"/>
+              </a:ext>
+            </a:extLst>
+          </p:cNvPr>
+          <p:cNvSpPr txBox="1"/>
+          <p:nvPr/>
+        </p:nvSpPr>
+        <p:spPr>
+          <a:xfrm>
+            <a:off x="476186" y="6031972"/>
+            <a:ext cx="11071578" cy="460902"/>
+          </a:xfrm>
+          <a:prstGeom prst="rect">
+            <a:avLst/>
+          </a:prstGeom>
+        </p:spPr>
+        <p:txBody>
+          <a:bodyPr vert="horz" wrap="square" lIns="91440" tIns="45720" rIns="91440" bIns="45720" rtlCol="0" anchor="ctr">
+            <a:noAutofit/>
+          </a:bodyPr>
+          <a:lstStyle/>
+          <a:p>
+            <a:r>
+              <a:rPr lang="da-DK" sz="1600" dirty="0">
+                <a:latin typeface="Gill Sans MT" panose="020B0502020104020203" pitchFamily="34" charset="0"/>
+                <a:hlinkClick r:id="rId5"/>
+              </a:rPr>
+              <a:t>https://learn.microsoft.com/en-us/dotnet/api/system.threading.thread.suspend?view=net-6.0#system-threading-thread-suspend</a:t>
+            </a:r>
+          </a:p>
+          <a:p>
+            <a:r>
+              <a:rPr lang="da-DK" sz="1600" dirty="0">
+                <a:latin typeface="Gill Sans MT" panose="020B0502020104020203" pitchFamily="34" charset="0"/>
+                <a:hlinkClick r:id="rId6"/>
+              </a:rPr>
+              <a:t>https://learn.microsoft.com/en-us/dotnet/api/system.threading.thread.resume?view=net-6.0#system-threading-thread-resume</a:t>
+            </a:r>
+            <a:r>
+              <a:rPr lang="da-DK" sz="1600" dirty="0">
+                <a:latin typeface="Gill Sans MT" panose="020B0502020104020203" pitchFamily="34" charset="0"/>
+                <a:hlinkClick r:id="rId5"/>
+              </a:rPr>
+              <a:t> </a:t>
+            </a:r>
+            <a:endParaRPr lang="da-DK" sz="1600" dirty="0">
+              <a:latin typeface="Gill Sans MT" panose="020B0502020104020203" pitchFamily="34" charset="0"/>
             </a:endParaRPr>
           </a:p>
         </p:txBody>
@@ -14906,7 +14956,7 @@
         <p:spPr>
           <a:xfrm>
             <a:off x="342090" y="1303505"/>
-            <a:ext cx="5543144" cy="5063428"/>
+            <a:ext cx="5543144" cy="4421886"/>
           </a:xfrm>
           <a:solidFill>
             <a:schemeClr val="bg2"/>
@@ -15211,7 +15261,7 @@
         <p:spPr>
           <a:xfrm>
             <a:off x="6096000" y="1303505"/>
-            <a:ext cx="5831840" cy="5063428"/>
+            <a:ext cx="5831840" cy="4421886"/>
           </a:xfrm>
           <a:prstGeom prst="rect">
             <a:avLst/>
@@ -15393,18 +15443,18 @@
               <a:buNone/>
             </a:pPr>
             <a:r>
-              <a:rPr lang="da-DK" sz="1400" b="1" dirty="0">
+              <a:rPr lang="da-DK" sz="1200" b="1" dirty="0">
                 <a:latin typeface="Consolas" panose="020B0609020204030204" pitchFamily="49" charset="0"/>
               </a:rPr>
               <a:t>public class </a:t>
             </a:r>
             <a:r>
-              <a:rPr lang="da-DK" sz="1400" b="1" dirty="0" err="1">
+              <a:rPr lang="da-DK" sz="1200" b="1" dirty="0" err="1">
                 <a:latin typeface="Consolas" panose="020B0609020204030204" pitchFamily="49" charset="0"/>
               </a:rPr>
               <a:t>LotsOfWork</a:t>
             </a:r>
-            <a:endParaRPr lang="da-DK" sz="1400" b="1" dirty="0">
+            <a:endParaRPr lang="da-DK" sz="1200" b="1" dirty="0">
               <a:latin typeface="Consolas" panose="020B0609020204030204" pitchFamily="49" charset="0"/>
             </a:endParaRPr>
           </a:p>
@@ -15413,7 +15463,7 @@
               <a:buNone/>
             </a:pPr>
             <a:r>
-              <a:rPr lang="da-DK" sz="1400" b="1" dirty="0">
+              <a:rPr lang="da-DK" sz="1200" b="1" dirty="0">
                 <a:latin typeface="Consolas" panose="020B0609020204030204" pitchFamily="49" charset="0"/>
               </a:rPr>
               <a:t>{</a:t>
@@ -15424,43 +15474,43 @@
               <a:buNone/>
             </a:pPr>
             <a:r>
-              <a:rPr lang="da-DK" sz="1400" b="1" dirty="0">
+              <a:rPr lang="da-DK" sz="1200" b="1" dirty="0">
                 <a:latin typeface="Consolas" panose="020B0609020204030204" pitchFamily="49" charset="0"/>
               </a:rPr>
               <a:t>  public </a:t>
             </a:r>
             <a:r>
-              <a:rPr lang="da-DK" sz="1400" b="1" dirty="0" err="1">
+              <a:rPr lang="da-DK" sz="1200" b="1" dirty="0" err="1">
                 <a:latin typeface="Consolas" panose="020B0609020204030204" pitchFamily="49" charset="0"/>
               </a:rPr>
               <a:t>bool</a:t>
             </a:r>
             <a:r>
-              <a:rPr lang="da-DK" sz="1400" b="1" dirty="0">
+              <a:rPr lang="da-DK" sz="1200" b="1" dirty="0">
                 <a:latin typeface="Consolas" panose="020B0609020204030204" pitchFamily="49" charset="0"/>
               </a:rPr>
               <a:t> </a:t>
             </a:r>
             <a:r>
-              <a:rPr lang="da-DK" sz="1400" b="1" dirty="0" err="1">
+              <a:rPr lang="da-DK" sz="1200" b="1" dirty="0" err="1">
                 <a:latin typeface="Consolas" panose="020B0609020204030204" pitchFamily="49" charset="0"/>
               </a:rPr>
               <a:t>ShallStop</a:t>
             </a:r>
             <a:r>
-              <a:rPr lang="da-DK" sz="1400" b="1" dirty="0">
+              <a:rPr lang="da-DK" sz="1200" b="1" dirty="0">
                 <a:latin typeface="Consolas" panose="020B0609020204030204" pitchFamily="49" charset="0"/>
               </a:rPr>
               <a:t> { </a:t>
             </a:r>
             <a:r>
-              <a:rPr lang="da-DK" sz="1400" b="1" dirty="0" err="1">
+              <a:rPr lang="da-DK" sz="1200" b="1" dirty="0" err="1">
                 <a:latin typeface="Consolas" panose="020B0609020204030204" pitchFamily="49" charset="0"/>
               </a:rPr>
               <a:t>get</a:t>
             </a:r>
             <a:r>
-              <a:rPr lang="da-DK" sz="1400" b="1" dirty="0">
+              <a:rPr lang="da-DK" sz="1200" b="1" dirty="0">
                 <a:latin typeface="Consolas" panose="020B0609020204030204" pitchFamily="49" charset="0"/>
               </a:rPr>
               <a:t>; set; } = false;</a:t>
@@ -15471,31 +15521,31 @@
               <a:buNone/>
             </a:pPr>
             <a:r>
-              <a:rPr lang="da-DK" sz="1400" b="1" dirty="0">
+              <a:rPr lang="da-DK" sz="1200" b="1" dirty="0">
                 <a:latin typeface="Consolas" panose="020B0609020204030204" pitchFamily="49" charset="0"/>
               </a:rPr>
               <a:t>  public </a:t>
             </a:r>
             <a:r>
-              <a:rPr lang="da-DK" sz="1400" b="1" dirty="0" err="1">
+              <a:rPr lang="da-DK" sz="1200" b="1" dirty="0" err="1">
                 <a:latin typeface="Consolas" panose="020B0609020204030204" pitchFamily="49" charset="0"/>
               </a:rPr>
               <a:t>void</a:t>
             </a:r>
             <a:r>
-              <a:rPr lang="da-DK" sz="1400" b="1" dirty="0">
+              <a:rPr lang="da-DK" sz="1200" b="1" dirty="0">
                 <a:latin typeface="Consolas" panose="020B0609020204030204" pitchFamily="49" charset="0"/>
               </a:rPr>
               <a:t> </a:t>
             </a:r>
             <a:r>
-              <a:rPr lang="da-DK" sz="1400" b="1" dirty="0" err="1">
+              <a:rPr lang="da-DK" sz="1200" b="1" dirty="0" err="1">
                 <a:latin typeface="Consolas" panose="020B0609020204030204" pitchFamily="49" charset="0"/>
               </a:rPr>
               <a:t>DoLotsOfWork</a:t>
             </a:r>
             <a:r>
-              <a:rPr lang="da-DK" sz="1400" b="1" dirty="0">
+              <a:rPr lang="da-DK" sz="1200" b="1" dirty="0">
                 <a:latin typeface="Consolas" panose="020B0609020204030204" pitchFamily="49" charset="0"/>
               </a:rPr>
               <a:t>()</a:t>
@@ -15506,7 +15556,7 @@
               <a:buNone/>
             </a:pPr>
             <a:r>
-              <a:rPr lang="da-DK" sz="1400" b="1" dirty="0">
+              <a:rPr lang="da-DK" sz="1200" b="1" dirty="0">
                 <a:latin typeface="Consolas" panose="020B0609020204030204" pitchFamily="49" charset="0"/>
               </a:rPr>
               <a:t>  {</a:t>
@@ -15517,31 +15567,31 @@
               <a:buNone/>
             </a:pPr>
             <a:r>
-              <a:rPr lang="da-DK" sz="1400" b="1" dirty="0">
+              <a:rPr lang="da-DK" sz="1200" b="1" dirty="0">
                 <a:latin typeface="Consolas" panose="020B0609020204030204" pitchFamily="49" charset="0"/>
               </a:rPr>
               <a:t>     </a:t>
             </a:r>
             <a:r>
-              <a:rPr lang="da-DK" sz="1400" b="1" dirty="0" err="1">
+              <a:rPr lang="da-DK" sz="1200" b="1" dirty="0" err="1">
                 <a:latin typeface="Consolas" panose="020B0609020204030204" pitchFamily="49" charset="0"/>
               </a:rPr>
               <a:t>int</a:t>
             </a:r>
             <a:r>
-              <a:rPr lang="da-DK" sz="1400" b="1" dirty="0">
+              <a:rPr lang="da-DK" sz="1200" b="1" dirty="0">
                 <a:latin typeface="Consolas" panose="020B0609020204030204" pitchFamily="49" charset="0"/>
               </a:rPr>
               <a:t> </a:t>
             </a:r>
             <a:r>
-              <a:rPr lang="da-DK" sz="1400" b="1" dirty="0" err="1">
+              <a:rPr lang="da-DK" sz="1200" b="1" dirty="0" err="1">
                 <a:latin typeface="Consolas" panose="020B0609020204030204" pitchFamily="49" charset="0"/>
               </a:rPr>
               <a:t>iteration</a:t>
             </a:r>
             <a:r>
-              <a:rPr lang="da-DK" sz="1400" b="1" dirty="0">
+              <a:rPr lang="da-DK" sz="1200" b="1" dirty="0">
                 <a:latin typeface="Consolas" panose="020B0609020204030204" pitchFamily="49" charset="0"/>
               </a:rPr>
               <a:t> = 0;</a:t>
@@ -15552,31 +15602,31 @@
               <a:buNone/>
             </a:pPr>
             <a:r>
-              <a:rPr lang="da-DK" sz="1400" b="1" dirty="0">
+              <a:rPr lang="da-DK" sz="1200" b="1" dirty="0">
                 <a:latin typeface="Consolas" panose="020B0609020204030204" pitchFamily="49" charset="0"/>
               </a:rPr>
               <a:t>     </a:t>
             </a:r>
             <a:r>
-              <a:rPr lang="da-DK" sz="1400" b="1" dirty="0" err="1">
+              <a:rPr lang="da-DK" sz="1200" b="1" dirty="0" err="1">
                 <a:latin typeface="Consolas" panose="020B0609020204030204" pitchFamily="49" charset="0"/>
               </a:rPr>
               <a:t>while</a:t>
             </a:r>
             <a:r>
-              <a:rPr lang="da-DK" sz="1400" b="1" dirty="0">
+              <a:rPr lang="da-DK" sz="1200" b="1" dirty="0">
                 <a:latin typeface="Consolas" panose="020B0609020204030204" pitchFamily="49" charset="0"/>
               </a:rPr>
               <a:t> (!</a:t>
             </a:r>
             <a:r>
-              <a:rPr lang="da-DK" sz="1400" b="1" dirty="0" err="1">
+              <a:rPr lang="da-DK" sz="1200" b="1" dirty="0" err="1">
                 <a:latin typeface="Consolas" panose="020B0609020204030204" pitchFamily="49" charset="0"/>
               </a:rPr>
               <a:t>ShallStop</a:t>
             </a:r>
             <a:r>
-              <a:rPr lang="da-DK" sz="1400" b="1" dirty="0">
+              <a:rPr lang="da-DK" sz="1200" b="1" dirty="0">
                 <a:latin typeface="Consolas" panose="020B0609020204030204" pitchFamily="49" charset="0"/>
               </a:rPr>
               <a:t>)</a:t>
@@ -15587,7 +15637,7 @@
               <a:buNone/>
             </a:pPr>
             <a:r>
-              <a:rPr lang="da-DK" sz="1400" b="1" dirty="0">
+              <a:rPr lang="da-DK" sz="1200" b="1" dirty="0">
                 <a:latin typeface="Consolas" panose="020B0609020204030204" pitchFamily="49" charset="0"/>
               </a:rPr>
               <a:t>     {</a:t>
@@ -15598,43 +15648,43 @@
               <a:buNone/>
             </a:pPr>
             <a:r>
-              <a:rPr lang="da-DK" sz="1400" b="1" dirty="0">
+              <a:rPr lang="da-DK" sz="1200" b="1" dirty="0">
                 <a:latin typeface="Consolas" panose="020B0609020204030204" pitchFamily="49" charset="0"/>
               </a:rPr>
               <a:t>         </a:t>
             </a:r>
             <a:r>
-              <a:rPr lang="da-DK" sz="1400" b="1" dirty="0" err="1">
+              <a:rPr lang="da-DK" sz="1200" b="1" dirty="0" err="1">
                 <a:latin typeface="Consolas" panose="020B0609020204030204" pitchFamily="49" charset="0"/>
               </a:rPr>
               <a:t>Console.WriteLine</a:t>
             </a:r>
             <a:r>
-              <a:rPr lang="da-DK" sz="1400" b="1" dirty="0">
+              <a:rPr lang="da-DK" sz="1200" b="1" dirty="0">
                 <a:latin typeface="Consolas" panose="020B0609020204030204" pitchFamily="49" charset="0"/>
               </a:rPr>
               <a:t>("</a:t>
             </a:r>
             <a:r>
-              <a:rPr lang="da-DK" sz="1400" b="1" dirty="0" err="1">
+              <a:rPr lang="da-DK" sz="1200" b="1" dirty="0" err="1">
                 <a:latin typeface="Consolas" panose="020B0609020204030204" pitchFamily="49" charset="0"/>
               </a:rPr>
               <a:t>iteration</a:t>
             </a:r>
             <a:r>
-              <a:rPr lang="da-DK" sz="1400" b="1" dirty="0">
+              <a:rPr lang="da-DK" sz="1200" b="1" dirty="0">
                 <a:latin typeface="Consolas" panose="020B0609020204030204" pitchFamily="49" charset="0"/>
               </a:rPr>
               <a:t>: {0}", </a:t>
             </a:r>
             <a:r>
-              <a:rPr lang="da-DK" sz="1400" b="1" dirty="0" err="1">
+              <a:rPr lang="da-DK" sz="1200" b="1" dirty="0" err="1">
                 <a:latin typeface="Consolas" panose="020B0609020204030204" pitchFamily="49" charset="0"/>
               </a:rPr>
               <a:t>iteration</a:t>
             </a:r>
             <a:r>
-              <a:rPr lang="da-DK" sz="1400" b="1" dirty="0">
+              <a:rPr lang="da-DK" sz="1200" b="1" dirty="0">
                 <a:latin typeface="Consolas" panose="020B0609020204030204" pitchFamily="49" charset="0"/>
               </a:rPr>
               <a:t>);</a:t>
@@ -15645,30 +15695,30 @@
               <a:buNone/>
             </a:pPr>
             <a:r>
-              <a:rPr lang="da-DK" sz="1400" b="1" dirty="0">
+              <a:rPr lang="da-DK" sz="1200" b="1" dirty="0">
                 <a:latin typeface="Consolas" panose="020B0609020204030204" pitchFamily="49" charset="0"/>
               </a:rPr>
               <a:t>         </a:t>
             </a:r>
             <a:r>
-              <a:rPr lang="da-DK" sz="1400" b="1" dirty="0" err="1">
+              <a:rPr lang="da-DK" sz="1200" b="1" dirty="0" err="1">
                 <a:latin typeface="Consolas" panose="020B0609020204030204" pitchFamily="49" charset="0"/>
               </a:rPr>
               <a:t>Thread.Sleep</a:t>
             </a:r>
             <a:r>
-              <a:rPr lang="da-DK" sz="1400" b="1" dirty="0">
+              <a:rPr lang="da-DK" sz="1200" b="1" dirty="0">
                 <a:latin typeface="Consolas" panose="020B0609020204030204" pitchFamily="49" charset="0"/>
               </a:rPr>
               <a:t>(50); // 50 </a:t>
             </a:r>
             <a:r>
-              <a:rPr lang="da-DK" sz="1400" b="1" dirty="0" err="1">
+              <a:rPr lang="da-DK" sz="1200" b="1" dirty="0" err="1">
                 <a:latin typeface="Consolas" panose="020B0609020204030204" pitchFamily="49" charset="0"/>
               </a:rPr>
               <a:t>milliseconds</a:t>
             </a:r>
-            <a:endParaRPr lang="da-DK" sz="1400" b="1" dirty="0">
+            <a:endParaRPr lang="da-DK" sz="1200" b="1" dirty="0">
               <a:latin typeface="Consolas" panose="020B0609020204030204" pitchFamily="49" charset="0"/>
             </a:endParaRPr>
           </a:p>
@@ -15677,19 +15727,19 @@
               <a:buNone/>
             </a:pPr>
             <a:r>
-              <a:rPr lang="da-DK" sz="1400" b="1" dirty="0">
+              <a:rPr lang="da-DK" sz="1200" b="1" dirty="0">
                 <a:latin typeface="Consolas" panose="020B0609020204030204" pitchFamily="49" charset="0"/>
               </a:rPr>
               <a:t>         </a:t>
             </a:r>
             <a:r>
-              <a:rPr lang="da-DK" sz="1400" b="1" dirty="0" err="1">
+              <a:rPr lang="da-DK" sz="1200" b="1" dirty="0" err="1">
                 <a:latin typeface="Consolas" panose="020B0609020204030204" pitchFamily="49" charset="0"/>
               </a:rPr>
               <a:t>iteration</a:t>
             </a:r>
             <a:r>
-              <a:rPr lang="da-DK" sz="1400" b="1" dirty="0">
+              <a:rPr lang="da-DK" sz="1200" b="1" dirty="0">
                 <a:latin typeface="Consolas" panose="020B0609020204030204" pitchFamily="49" charset="0"/>
               </a:rPr>
               <a:t>++;</a:t>
@@ -15700,7 +15750,7 @@
               <a:buNone/>
             </a:pPr>
             <a:r>
-              <a:rPr lang="da-DK" sz="1400" b="1" dirty="0">
+              <a:rPr lang="da-DK" sz="1200" b="1" dirty="0">
                 <a:latin typeface="Consolas" panose="020B0609020204030204" pitchFamily="49" charset="0"/>
               </a:rPr>
               <a:t>     }</a:t>
@@ -15711,19 +15761,19 @@
               <a:buNone/>
             </a:pPr>
             <a:r>
-              <a:rPr lang="da-DK" sz="1400" b="1" dirty="0">
+              <a:rPr lang="da-DK" sz="1200" b="1" dirty="0">
                 <a:latin typeface="Consolas" panose="020B0609020204030204" pitchFamily="49" charset="0"/>
               </a:rPr>
               <a:t>     </a:t>
             </a:r>
             <a:r>
-              <a:rPr lang="da-DK" sz="1400" b="1" dirty="0" err="1">
+              <a:rPr lang="da-DK" sz="1200" b="1" dirty="0" err="1">
                 <a:latin typeface="Consolas" panose="020B0609020204030204" pitchFamily="49" charset="0"/>
               </a:rPr>
               <a:t>Console.WriteLine</a:t>
             </a:r>
             <a:r>
-              <a:rPr lang="da-DK" sz="1400" b="1" dirty="0">
+              <a:rPr lang="da-DK" sz="1200" b="1" dirty="0">
                 <a:latin typeface="Consolas" panose="020B0609020204030204" pitchFamily="49" charset="0"/>
               </a:rPr>
               <a:t>("Thread is done!");</a:t>
@@ -15734,7 +15784,7 @@
               <a:buNone/>
             </a:pPr>
             <a:r>
-              <a:rPr lang="da-DK" sz="1400" b="1" dirty="0">
+              <a:rPr lang="da-DK" sz="1200" b="1" dirty="0">
                 <a:latin typeface="Consolas" panose="020B0609020204030204" pitchFamily="49" charset="0"/>
               </a:rPr>
               <a:t>  }</a:t>
@@ -15745,10 +15795,52 @@
               <a:buNone/>
             </a:pPr>
             <a:r>
-              <a:rPr lang="da-DK" sz="1400" b="1" dirty="0">
+              <a:rPr lang="da-DK" sz="1200" b="1" dirty="0">
                 <a:latin typeface="Consolas" panose="020B0609020204030204" pitchFamily="49" charset="0"/>
               </a:rPr>
               <a:t>}</a:t>
+            </a:r>
+          </a:p>
+        </p:txBody>
+      </p:sp>
+      <p:sp>
+        <p:nvSpPr>
+          <p:cNvPr id="5" name="TextBox 4">
+            <a:extLst>
+              <a:ext uri="{FF2B5EF4-FFF2-40B4-BE49-F238E27FC236}">
+                <a16:creationId xmlns:a16="http://schemas.microsoft.com/office/drawing/2014/main" id="{A3A477BE-E813-0EF5-F7AD-154C12EED081}"/>
+              </a:ext>
+            </a:extLst>
+          </p:cNvPr>
+          <p:cNvSpPr txBox="1"/>
+          <p:nvPr/>
+        </p:nvSpPr>
+        <p:spPr>
+          <a:xfrm>
+            <a:off x="342090" y="5844619"/>
+            <a:ext cx="11258144" cy="669303"/>
+          </a:xfrm>
+          <a:prstGeom prst="rect">
+            <a:avLst/>
+          </a:prstGeom>
+        </p:spPr>
+        <p:txBody>
+          <a:bodyPr vert="horz" wrap="square" lIns="91440" tIns="45720" rIns="91440" bIns="45720" rtlCol="0" anchor="ctr">
+            <a:normAutofit/>
+          </a:bodyPr>
+          <a:lstStyle/>
+          <a:p>
+            <a:r>
+              <a:rPr lang="en-GB" b="1" dirty="0">
+                <a:latin typeface="Gill Sans MT" panose="020B0502020104020203" pitchFamily="34" charset="0"/>
+              </a:rPr>
+              <a:t>Obsolete:</a:t>
+            </a:r>
+            <a:r>
+              <a:rPr lang="en-GB" dirty="0">
+                <a:latin typeface="Gill Sans MT" panose="020B0502020104020203" pitchFamily="34" charset="0"/>
+              </a:rPr>
+              <a:t> From .NET 5.0 and will add a compile time warning. So close threads in gracefully</a:t>
             </a:r>
           </a:p>
         </p:txBody>

</xml_diff>

<commit_message>
cant't remember the exact updates...
</commit_message>
<xml_diff>
--- a/05 Parallel programming/Threading.pptx
+++ b/05 Parallel programming/Threading.pptx
@@ -260,7 +260,7 @@
           <a:p>
             <a:fld id="{C3D45B35-5990-4A22-9246-3EAB55A12994}" type="datetimeFigureOut">
               <a:rPr lang="da-DK" smtClean="0"/>
-              <a:t>25-09-2024</a:t>
+              <a:t>17-09-2025</a:t>
             </a:fld>
             <a:endParaRPr lang="da-DK"/>
           </a:p>
@@ -677,7 +677,7 @@
           <a:p>
             <a:fld id="{E41AB761-37ED-4EFA-99FC-D346B55B115C}" type="slidenum">
               <a:rPr lang="da-DK" smtClean="0"/>
-              <a:t>14</a:t>
+              <a:t>12</a:t>
             </a:fld>
             <a:endParaRPr lang="da-DK"/>
           </a:p>
@@ -686,7 +686,7 @@
     </p:spTree>
     <p:extLst>
       <p:ext uri="{BB962C8B-B14F-4D97-AF65-F5344CB8AC3E}">
-        <p14:creationId xmlns:p14="http://schemas.microsoft.com/office/powerpoint/2010/main" val="2381020641"/>
+        <p14:creationId xmlns:p14="http://schemas.microsoft.com/office/powerpoint/2010/main" val="1946887577"/>
       </p:ext>
     </p:extLst>
   </p:cSld>
@@ -740,62 +740,7 @@
           <a:bodyPr/>
           <a:lstStyle/>
           <a:p>
-            <a:r>
-              <a:rPr lang="da-DK" dirty="0" err="1"/>
-              <a:t>We</a:t>
-            </a:r>
-            <a:r>
-              <a:rPr lang="da-DK" dirty="0"/>
-              <a:t> </a:t>
-            </a:r>
-            <a:r>
-              <a:rPr lang="da-DK" dirty="0" err="1"/>
-              <a:t>will</a:t>
-            </a:r>
-            <a:r>
-              <a:rPr lang="da-DK" dirty="0"/>
-              <a:t> talk </a:t>
-            </a:r>
-            <a:r>
-              <a:rPr lang="da-DK" dirty="0" err="1"/>
-              <a:t>about</a:t>
-            </a:r>
-            <a:r>
-              <a:rPr lang="da-DK" dirty="0"/>
-              <a:t> </a:t>
-            </a:r>
-            <a:r>
-              <a:rPr lang="da-DK" dirty="0" err="1"/>
-              <a:t>thread</a:t>
-            </a:r>
-            <a:r>
-              <a:rPr lang="da-DK" dirty="0"/>
-              <a:t> </a:t>
-            </a:r>
-            <a:r>
-              <a:rPr lang="da-DK" dirty="0" err="1"/>
-              <a:t>synchronization</a:t>
-            </a:r>
-            <a:r>
-              <a:rPr lang="da-DK" dirty="0"/>
-              <a:t> </a:t>
-            </a:r>
-            <a:r>
-              <a:rPr lang="da-DK" dirty="0" err="1"/>
-              <a:t>next</a:t>
-            </a:r>
-            <a:r>
-              <a:rPr lang="da-DK" dirty="0"/>
-              <a:t> </a:t>
-            </a:r>
-            <a:r>
-              <a:rPr lang="da-DK" dirty="0" err="1"/>
-              <a:t>week</a:t>
-            </a:r>
-            <a:r>
-              <a:rPr lang="da-DK" dirty="0"/>
-              <a:t>.</a:t>
-            </a:r>
+            <a:endParaRPr lang="da-DK" dirty="0"/>
           </a:p>
         </p:txBody>
       </p:sp>
@@ -816,7 +761,7 @@
           <a:p>
             <a:fld id="{E41AB761-37ED-4EFA-99FC-D346B55B115C}" type="slidenum">
               <a:rPr lang="da-DK" smtClean="0"/>
-              <a:t>15</a:t>
+              <a:t>14</a:t>
             </a:fld>
             <a:endParaRPr lang="da-DK"/>
           </a:p>
@@ -825,7 +770,7 @@
     </p:spTree>
     <p:extLst>
       <p:ext uri="{BB962C8B-B14F-4D97-AF65-F5344CB8AC3E}">
-        <p14:creationId xmlns:p14="http://schemas.microsoft.com/office/powerpoint/2010/main" val="3681877887"/>
+        <p14:creationId xmlns:p14="http://schemas.microsoft.com/office/powerpoint/2010/main" val="2381020641"/>
       </p:ext>
     </p:extLst>
   </p:cSld>
@@ -881,69 +826,59 @@
           <a:p>
             <a:r>
               <a:rPr lang="da-DK" dirty="0" err="1"/>
-              <a:t>When</a:t>
-            </a:r>
-            <a:r>
-              <a:rPr lang="da-DK" baseline="0" dirty="0"/>
-              <a:t> do </a:t>
-            </a:r>
-            <a:r>
-              <a:rPr lang="da-DK" baseline="0" dirty="0" err="1"/>
-              <a:t>we</a:t>
-            </a:r>
-            <a:r>
-              <a:rPr lang="da-DK" baseline="0" dirty="0"/>
+              <a:t>We</a:t>
+            </a:r>
+            <a:r>
+              <a:rPr lang="da-DK" dirty="0"/>
               <a:t> </a:t>
             </a:r>
             <a:r>
-              <a:rPr lang="da-DK" baseline="0" dirty="0" err="1"/>
-              <a:t>see</a:t>
-            </a:r>
-            <a:r>
-              <a:rPr lang="da-DK" baseline="0" dirty="0"/>
-              <a:t> the ”</a:t>
-            </a:r>
-            <a:r>
-              <a:rPr lang="da-DK" baseline="0" dirty="0" err="1"/>
-              <a:t>Goodbye</a:t>
-            </a:r>
-            <a:r>
-              <a:rPr lang="da-DK" baseline="0" dirty="0"/>
-              <a:t> from </a:t>
-            </a:r>
-            <a:r>
-              <a:rPr lang="da-DK" baseline="0" dirty="0" err="1"/>
-              <a:t>main</a:t>
-            </a:r>
-            <a:r>
-              <a:rPr lang="da-DK" baseline="0" dirty="0"/>
-              <a:t>” line in the </a:t>
-            </a:r>
-            <a:r>
-              <a:rPr lang="da-DK" baseline="0" dirty="0" err="1"/>
-              <a:t>console</a:t>
-            </a:r>
-            <a:r>
-              <a:rPr lang="da-DK" baseline="0" dirty="0"/>
-              <a:t>?</a:t>
-            </a:r>
-          </a:p>
-          <a:p>
-            <a:r>
-              <a:rPr lang="da-DK" baseline="0" dirty="0" err="1"/>
-              <a:t>When</a:t>
-            </a:r>
-            <a:r>
-              <a:rPr lang="da-DK" baseline="0" dirty="0"/>
+              <a:rPr lang="da-DK" dirty="0" err="1"/>
+              <a:t>will</a:t>
+            </a:r>
+            <a:r>
+              <a:rPr lang="da-DK" dirty="0"/>
+              <a:t> talk </a:t>
+            </a:r>
+            <a:r>
+              <a:rPr lang="da-DK" dirty="0" err="1"/>
+              <a:t>about</a:t>
+            </a:r>
+            <a:r>
+              <a:rPr lang="da-DK" dirty="0"/>
               <a:t> </a:t>
             </a:r>
             <a:r>
-              <a:rPr lang="da-DK" baseline="0" dirty="0" err="1"/>
-              <a:t>does</a:t>
-            </a:r>
-            <a:r>
-              <a:rPr lang="da-DK" baseline="0" dirty="0"/>
-              <a:t> the program exit?</a:t>
+              <a:rPr lang="da-DK" dirty="0" err="1"/>
+              <a:t>thread</a:t>
+            </a:r>
+            <a:r>
+              <a:rPr lang="da-DK" dirty="0"/>
+              <a:t> </a:t>
+            </a:r>
+            <a:r>
+              <a:rPr lang="da-DK" dirty="0" err="1"/>
+              <a:t>synchronization</a:t>
+            </a:r>
+            <a:r>
+              <a:rPr lang="da-DK" dirty="0"/>
+              <a:t> </a:t>
+            </a:r>
+            <a:r>
+              <a:rPr lang="da-DK" dirty="0" err="1"/>
+              <a:t>next</a:t>
+            </a:r>
+            <a:r>
+              <a:rPr lang="da-DK" dirty="0"/>
+              <a:t> </a:t>
+            </a:r>
+            <a:r>
+              <a:rPr lang="da-DK" dirty="0" err="1"/>
+              <a:t>week</a:t>
+            </a:r>
+            <a:r>
+              <a:rPr lang="da-DK" dirty="0"/>
+              <a:t>.</a:t>
             </a:r>
           </a:p>
         </p:txBody>
@@ -965,7 +900,7 @@
           <a:p>
             <a:fld id="{E41AB761-37ED-4EFA-99FC-D346B55B115C}" type="slidenum">
               <a:rPr lang="da-DK" smtClean="0"/>
-              <a:t>16</a:t>
+              <a:t>15</a:t>
             </a:fld>
             <a:endParaRPr lang="da-DK"/>
           </a:p>
@@ -974,7 +909,7 @@
     </p:spTree>
     <p:extLst>
       <p:ext uri="{BB962C8B-B14F-4D97-AF65-F5344CB8AC3E}">
-        <p14:creationId xmlns:p14="http://schemas.microsoft.com/office/powerpoint/2010/main" val="422033337"/>
+        <p14:creationId xmlns:p14="http://schemas.microsoft.com/office/powerpoint/2010/main" val="3681877887"/>
       </p:ext>
     </p:extLst>
   </p:cSld>
@@ -1028,7 +963,72 @@
           <a:bodyPr/>
           <a:lstStyle/>
           <a:p>
-            <a:endParaRPr lang="da-DK" dirty="0"/>
+            <a:r>
+              <a:rPr lang="da-DK" dirty="0" err="1"/>
+              <a:t>When</a:t>
+            </a:r>
+            <a:r>
+              <a:rPr lang="da-DK" baseline="0" dirty="0"/>
+              <a:t> do </a:t>
+            </a:r>
+            <a:r>
+              <a:rPr lang="da-DK" baseline="0" dirty="0" err="1"/>
+              <a:t>we</a:t>
+            </a:r>
+            <a:r>
+              <a:rPr lang="da-DK" baseline="0" dirty="0"/>
+              <a:t> </a:t>
+            </a:r>
+            <a:r>
+              <a:rPr lang="da-DK" baseline="0" dirty="0" err="1"/>
+              <a:t>see</a:t>
+            </a:r>
+            <a:r>
+              <a:rPr lang="da-DK" baseline="0" dirty="0"/>
+              <a:t> the ”</a:t>
+            </a:r>
+            <a:r>
+              <a:rPr lang="da-DK" baseline="0" dirty="0" err="1"/>
+              <a:t>Goodbye</a:t>
+            </a:r>
+            <a:r>
+              <a:rPr lang="da-DK" baseline="0" dirty="0"/>
+              <a:t> from </a:t>
+            </a:r>
+            <a:r>
+              <a:rPr lang="da-DK" baseline="0" dirty="0" err="1"/>
+              <a:t>main</a:t>
+            </a:r>
+            <a:r>
+              <a:rPr lang="da-DK" baseline="0" dirty="0"/>
+              <a:t>” line in the </a:t>
+            </a:r>
+            <a:r>
+              <a:rPr lang="da-DK" baseline="0" dirty="0" err="1"/>
+              <a:t>console</a:t>
+            </a:r>
+            <a:r>
+              <a:rPr lang="da-DK" baseline="0" dirty="0"/>
+              <a:t>?</a:t>
+            </a:r>
+          </a:p>
+          <a:p>
+            <a:r>
+              <a:rPr lang="da-DK" baseline="0" dirty="0" err="1"/>
+              <a:t>When</a:t>
+            </a:r>
+            <a:r>
+              <a:rPr lang="da-DK" baseline="0" dirty="0"/>
+              <a:t> </a:t>
+            </a:r>
+            <a:r>
+              <a:rPr lang="da-DK" baseline="0" dirty="0" err="1"/>
+              <a:t>does</a:t>
+            </a:r>
+            <a:r>
+              <a:rPr lang="da-DK" baseline="0" dirty="0"/>
+              <a:t> the program exit?</a:t>
+            </a:r>
           </a:p>
         </p:txBody>
       </p:sp>
@@ -1049,7 +1049,7 @@
           <a:p>
             <a:fld id="{E41AB761-37ED-4EFA-99FC-D346B55B115C}" type="slidenum">
               <a:rPr lang="da-DK" smtClean="0"/>
-              <a:t>19</a:t>
+              <a:t>16</a:t>
             </a:fld>
             <a:endParaRPr lang="da-DK"/>
           </a:p>
@@ -1058,7 +1058,7 @@
     </p:spTree>
     <p:extLst>
       <p:ext uri="{BB962C8B-B14F-4D97-AF65-F5344CB8AC3E}">
-        <p14:creationId xmlns:p14="http://schemas.microsoft.com/office/powerpoint/2010/main" val="4108337305"/>
+        <p14:creationId xmlns:p14="http://schemas.microsoft.com/office/powerpoint/2010/main" val="422033337"/>
       </p:ext>
     </p:extLst>
   </p:cSld>
@@ -1112,244 +1112,7 @@
           <a:bodyPr/>
           <a:lstStyle/>
           <a:p>
-            <a:r>
-              <a:rPr lang="da-DK" dirty="0"/>
-              <a:t>If </a:t>
-            </a:r>
-            <a:r>
-              <a:rPr lang="da-DK" dirty="0" err="1"/>
-              <a:t>we</a:t>
-            </a:r>
-            <a:r>
-              <a:rPr lang="da-DK" dirty="0"/>
-              <a:t> </a:t>
-            </a:r>
-            <a:r>
-              <a:rPr lang="da-DK" dirty="0" err="1"/>
-              <a:t>want</a:t>
-            </a:r>
-            <a:r>
-              <a:rPr lang="da-DK" dirty="0"/>
-              <a:t> to stop a </a:t>
-            </a:r>
-            <a:r>
-              <a:rPr lang="da-DK" dirty="0" err="1"/>
-              <a:t>thread</a:t>
-            </a:r>
-            <a:r>
-              <a:rPr lang="da-DK" dirty="0"/>
-              <a:t> </a:t>
-            </a:r>
-            <a:r>
-              <a:rPr lang="da-DK" dirty="0" err="1"/>
-              <a:t>gracefully</a:t>
-            </a:r>
-            <a:r>
-              <a:rPr lang="da-DK" dirty="0"/>
-              <a:t>, </a:t>
-            </a:r>
-            <a:r>
-              <a:rPr lang="da-DK" dirty="0" err="1"/>
-              <a:t>we</a:t>
-            </a:r>
-            <a:r>
-              <a:rPr lang="da-DK" dirty="0"/>
-              <a:t> </a:t>
-            </a:r>
-            <a:r>
-              <a:rPr lang="da-DK" dirty="0" err="1"/>
-              <a:t>shall</a:t>
-            </a:r>
-            <a:r>
-              <a:rPr lang="da-DK" dirty="0"/>
-              <a:t> </a:t>
-            </a:r>
-            <a:r>
-              <a:rPr lang="da-DK" dirty="0" err="1"/>
-              <a:t>add</a:t>
-            </a:r>
-            <a:r>
-              <a:rPr lang="da-DK" dirty="0"/>
-              <a:t> a </a:t>
-            </a:r>
-            <a:r>
-              <a:rPr lang="da-DK" dirty="0" err="1"/>
-              <a:t>way</a:t>
-            </a:r>
-            <a:r>
-              <a:rPr lang="da-DK" dirty="0"/>
-              <a:t> to </a:t>
-            </a:r>
-            <a:r>
-              <a:rPr lang="da-DK" dirty="0" err="1"/>
-              <a:t>tell</a:t>
-            </a:r>
-            <a:r>
-              <a:rPr lang="da-DK" dirty="0"/>
-              <a:t> it to</a:t>
-            </a:r>
-            <a:r>
-              <a:rPr lang="da-DK" baseline="0" dirty="0"/>
-              <a:t> the </a:t>
-            </a:r>
-            <a:r>
-              <a:rPr lang="da-DK" baseline="0" dirty="0" err="1"/>
-              <a:t>thread</a:t>
-            </a:r>
-            <a:r>
-              <a:rPr lang="da-DK" baseline="0" dirty="0"/>
-              <a:t>.</a:t>
-            </a:r>
-          </a:p>
-          <a:p>
-            <a:r>
-              <a:rPr lang="da-DK" baseline="0" dirty="0"/>
-              <a:t>For </a:t>
-            </a:r>
-            <a:r>
-              <a:rPr lang="da-DK" baseline="0" dirty="0" err="1"/>
-              <a:t>instance</a:t>
-            </a:r>
-            <a:r>
-              <a:rPr lang="da-DK" baseline="0" dirty="0"/>
-              <a:t> </a:t>
-            </a:r>
-            <a:r>
-              <a:rPr lang="da-DK" baseline="0" dirty="0" err="1"/>
-              <a:t>through</a:t>
-            </a:r>
-            <a:r>
-              <a:rPr lang="da-DK" baseline="0" dirty="0"/>
-              <a:t> a </a:t>
-            </a:r>
-            <a:r>
-              <a:rPr lang="da-DK" baseline="0" dirty="0" err="1"/>
-              <a:t>property</a:t>
-            </a:r>
-            <a:r>
-              <a:rPr lang="da-DK" baseline="0" dirty="0"/>
-              <a:t>.</a:t>
-            </a:r>
-          </a:p>
-          <a:p>
-            <a:r>
-              <a:rPr lang="da-DK" baseline="0" dirty="0" err="1"/>
-              <a:t>Another</a:t>
-            </a:r>
-            <a:r>
-              <a:rPr lang="da-DK" baseline="0" dirty="0"/>
-              <a:t> </a:t>
-            </a:r>
-            <a:r>
-              <a:rPr lang="da-DK" baseline="0" dirty="0" err="1"/>
-              <a:t>way</a:t>
-            </a:r>
-            <a:r>
-              <a:rPr lang="da-DK" baseline="0" dirty="0"/>
-              <a:t> </a:t>
-            </a:r>
-            <a:r>
-              <a:rPr lang="da-DK" baseline="0" dirty="0" err="1"/>
-              <a:t>could</a:t>
-            </a:r>
-            <a:r>
-              <a:rPr lang="da-DK" baseline="0" dirty="0"/>
-              <a:t> </a:t>
-            </a:r>
-            <a:r>
-              <a:rPr lang="da-DK" baseline="0" dirty="0" err="1"/>
-              <a:t>be</a:t>
-            </a:r>
-            <a:r>
-              <a:rPr lang="da-DK" baseline="0" dirty="0"/>
-              <a:t> to send it a </a:t>
-            </a:r>
-            <a:r>
-              <a:rPr lang="da-DK" baseline="0" dirty="0" err="1"/>
-              <a:t>message</a:t>
-            </a:r>
-            <a:r>
-              <a:rPr lang="da-DK" baseline="0" dirty="0"/>
-              <a:t>, </a:t>
-            </a:r>
-            <a:r>
-              <a:rPr lang="da-DK" baseline="0" dirty="0" err="1"/>
-              <a:t>if</a:t>
-            </a:r>
-            <a:r>
-              <a:rPr lang="da-DK" baseline="0" dirty="0"/>
-              <a:t> the </a:t>
-            </a:r>
-            <a:r>
-              <a:rPr lang="da-DK" baseline="0" dirty="0" err="1"/>
-              <a:t>thread</a:t>
-            </a:r>
-            <a:r>
-              <a:rPr lang="da-DK" baseline="0" dirty="0"/>
-              <a:t> </a:t>
-            </a:r>
-            <a:r>
-              <a:rPr lang="da-DK" baseline="0" dirty="0" err="1"/>
-              <a:t>consumes</a:t>
-            </a:r>
-            <a:r>
-              <a:rPr lang="da-DK" baseline="0" dirty="0"/>
-              <a:t> </a:t>
-            </a:r>
-            <a:r>
-              <a:rPr lang="da-DK" baseline="0" dirty="0" err="1"/>
-              <a:t>messages</a:t>
-            </a:r>
-            <a:r>
-              <a:rPr lang="da-DK" baseline="0" dirty="0"/>
-              <a:t>.</a:t>
-            </a:r>
-          </a:p>
-          <a:p>
-            <a:r>
-              <a:rPr lang="da-DK" baseline="0" dirty="0"/>
-              <a:t>Or give the </a:t>
-            </a:r>
-            <a:r>
-              <a:rPr lang="da-DK" baseline="0" dirty="0" err="1"/>
-              <a:t>thread</a:t>
-            </a:r>
-            <a:r>
-              <a:rPr lang="da-DK" baseline="0" dirty="0"/>
-              <a:t> a ”</a:t>
-            </a:r>
-            <a:r>
-              <a:rPr lang="da-DK" baseline="0" dirty="0" err="1"/>
-              <a:t>CancellationToken</a:t>
-            </a:r>
-            <a:r>
-              <a:rPr lang="da-DK" baseline="0" dirty="0"/>
-              <a:t>” </a:t>
-            </a:r>
-            <a:r>
-              <a:rPr lang="da-DK" baseline="0" dirty="0" err="1"/>
-              <a:t>object</a:t>
-            </a:r>
-            <a:r>
-              <a:rPr lang="da-DK" baseline="0" dirty="0"/>
-              <a:t> as the parameter to the </a:t>
-            </a:r>
-            <a:r>
-              <a:rPr lang="da-DK" baseline="0" dirty="0" err="1"/>
-              <a:t>myThread.Start</a:t>
-            </a:r>
-            <a:r>
-              <a:rPr lang="da-DK" baseline="0" dirty="0"/>
-              <a:t>() </a:t>
-            </a:r>
-            <a:r>
-              <a:rPr lang="da-DK" baseline="0" dirty="0" err="1"/>
-              <a:t>method</a:t>
-            </a:r>
-            <a:r>
-              <a:rPr lang="da-DK" baseline="0" dirty="0"/>
-              <a:t>.</a:t>
-            </a:r>
+            <a:endParaRPr lang="da-DK" dirty="0"/>
           </a:p>
         </p:txBody>
       </p:sp>
@@ -1370,7 +1133,7 @@
           <a:p>
             <a:fld id="{E41AB761-37ED-4EFA-99FC-D346B55B115C}" type="slidenum">
               <a:rPr lang="da-DK" smtClean="0"/>
-              <a:t>21</a:t>
+              <a:t>19</a:t>
             </a:fld>
             <a:endParaRPr lang="da-DK"/>
           </a:p>
@@ -1379,7 +1142,7 @@
     </p:spTree>
     <p:extLst>
       <p:ext uri="{BB962C8B-B14F-4D97-AF65-F5344CB8AC3E}">
-        <p14:creationId xmlns:p14="http://schemas.microsoft.com/office/powerpoint/2010/main" val="1775698752"/>
+        <p14:creationId xmlns:p14="http://schemas.microsoft.com/office/powerpoint/2010/main" val="4108337305"/>
       </p:ext>
     </p:extLst>
   </p:cSld>
@@ -1433,7 +1196,244 @@
           <a:bodyPr/>
           <a:lstStyle/>
           <a:p>
-            <a:endParaRPr lang="da-DK" baseline="0" dirty="0"/>
+            <a:r>
+              <a:rPr lang="da-DK" dirty="0"/>
+              <a:t>If </a:t>
+            </a:r>
+            <a:r>
+              <a:rPr lang="da-DK" dirty="0" err="1"/>
+              <a:t>we</a:t>
+            </a:r>
+            <a:r>
+              <a:rPr lang="da-DK" dirty="0"/>
+              <a:t> </a:t>
+            </a:r>
+            <a:r>
+              <a:rPr lang="da-DK" dirty="0" err="1"/>
+              <a:t>want</a:t>
+            </a:r>
+            <a:r>
+              <a:rPr lang="da-DK" dirty="0"/>
+              <a:t> to stop a </a:t>
+            </a:r>
+            <a:r>
+              <a:rPr lang="da-DK" dirty="0" err="1"/>
+              <a:t>thread</a:t>
+            </a:r>
+            <a:r>
+              <a:rPr lang="da-DK" dirty="0"/>
+              <a:t> </a:t>
+            </a:r>
+            <a:r>
+              <a:rPr lang="da-DK" dirty="0" err="1"/>
+              <a:t>gracefully</a:t>
+            </a:r>
+            <a:r>
+              <a:rPr lang="da-DK" dirty="0"/>
+              <a:t>, </a:t>
+            </a:r>
+            <a:r>
+              <a:rPr lang="da-DK" dirty="0" err="1"/>
+              <a:t>we</a:t>
+            </a:r>
+            <a:r>
+              <a:rPr lang="da-DK" dirty="0"/>
+              <a:t> </a:t>
+            </a:r>
+            <a:r>
+              <a:rPr lang="da-DK" dirty="0" err="1"/>
+              <a:t>shall</a:t>
+            </a:r>
+            <a:r>
+              <a:rPr lang="da-DK" dirty="0"/>
+              <a:t> </a:t>
+            </a:r>
+            <a:r>
+              <a:rPr lang="da-DK" dirty="0" err="1"/>
+              <a:t>add</a:t>
+            </a:r>
+            <a:r>
+              <a:rPr lang="da-DK" dirty="0"/>
+              <a:t> a </a:t>
+            </a:r>
+            <a:r>
+              <a:rPr lang="da-DK" dirty="0" err="1"/>
+              <a:t>way</a:t>
+            </a:r>
+            <a:r>
+              <a:rPr lang="da-DK" dirty="0"/>
+              <a:t> to </a:t>
+            </a:r>
+            <a:r>
+              <a:rPr lang="da-DK" dirty="0" err="1"/>
+              <a:t>tell</a:t>
+            </a:r>
+            <a:r>
+              <a:rPr lang="da-DK" dirty="0"/>
+              <a:t> it to</a:t>
+            </a:r>
+            <a:r>
+              <a:rPr lang="da-DK" baseline="0" dirty="0"/>
+              <a:t> the </a:t>
+            </a:r>
+            <a:r>
+              <a:rPr lang="da-DK" baseline="0" dirty="0" err="1"/>
+              <a:t>thread</a:t>
+            </a:r>
+            <a:r>
+              <a:rPr lang="da-DK" baseline="0" dirty="0"/>
+              <a:t>.</a:t>
+            </a:r>
+          </a:p>
+          <a:p>
+            <a:r>
+              <a:rPr lang="da-DK" baseline="0" dirty="0"/>
+              <a:t>For </a:t>
+            </a:r>
+            <a:r>
+              <a:rPr lang="da-DK" baseline="0" dirty="0" err="1"/>
+              <a:t>instance</a:t>
+            </a:r>
+            <a:r>
+              <a:rPr lang="da-DK" baseline="0" dirty="0"/>
+              <a:t> </a:t>
+            </a:r>
+            <a:r>
+              <a:rPr lang="da-DK" baseline="0" dirty="0" err="1"/>
+              <a:t>through</a:t>
+            </a:r>
+            <a:r>
+              <a:rPr lang="da-DK" baseline="0" dirty="0"/>
+              <a:t> a </a:t>
+            </a:r>
+            <a:r>
+              <a:rPr lang="da-DK" baseline="0" dirty="0" err="1"/>
+              <a:t>property</a:t>
+            </a:r>
+            <a:r>
+              <a:rPr lang="da-DK" baseline="0" dirty="0"/>
+              <a:t>.</a:t>
+            </a:r>
+          </a:p>
+          <a:p>
+            <a:r>
+              <a:rPr lang="da-DK" baseline="0" dirty="0" err="1"/>
+              <a:t>Another</a:t>
+            </a:r>
+            <a:r>
+              <a:rPr lang="da-DK" baseline="0" dirty="0"/>
+              <a:t> </a:t>
+            </a:r>
+            <a:r>
+              <a:rPr lang="da-DK" baseline="0" dirty="0" err="1"/>
+              <a:t>way</a:t>
+            </a:r>
+            <a:r>
+              <a:rPr lang="da-DK" baseline="0" dirty="0"/>
+              <a:t> </a:t>
+            </a:r>
+            <a:r>
+              <a:rPr lang="da-DK" baseline="0" dirty="0" err="1"/>
+              <a:t>could</a:t>
+            </a:r>
+            <a:r>
+              <a:rPr lang="da-DK" baseline="0" dirty="0"/>
+              <a:t> </a:t>
+            </a:r>
+            <a:r>
+              <a:rPr lang="da-DK" baseline="0" dirty="0" err="1"/>
+              <a:t>be</a:t>
+            </a:r>
+            <a:r>
+              <a:rPr lang="da-DK" baseline="0" dirty="0"/>
+              <a:t> to send it a </a:t>
+            </a:r>
+            <a:r>
+              <a:rPr lang="da-DK" baseline="0" dirty="0" err="1"/>
+              <a:t>message</a:t>
+            </a:r>
+            <a:r>
+              <a:rPr lang="da-DK" baseline="0" dirty="0"/>
+              <a:t>, </a:t>
+            </a:r>
+            <a:r>
+              <a:rPr lang="da-DK" baseline="0" dirty="0" err="1"/>
+              <a:t>if</a:t>
+            </a:r>
+            <a:r>
+              <a:rPr lang="da-DK" baseline="0" dirty="0"/>
+              <a:t> the </a:t>
+            </a:r>
+            <a:r>
+              <a:rPr lang="da-DK" baseline="0" dirty="0" err="1"/>
+              <a:t>thread</a:t>
+            </a:r>
+            <a:r>
+              <a:rPr lang="da-DK" baseline="0" dirty="0"/>
+              <a:t> </a:t>
+            </a:r>
+            <a:r>
+              <a:rPr lang="da-DK" baseline="0" dirty="0" err="1"/>
+              <a:t>consumes</a:t>
+            </a:r>
+            <a:r>
+              <a:rPr lang="da-DK" baseline="0" dirty="0"/>
+              <a:t> </a:t>
+            </a:r>
+            <a:r>
+              <a:rPr lang="da-DK" baseline="0" dirty="0" err="1"/>
+              <a:t>messages</a:t>
+            </a:r>
+            <a:r>
+              <a:rPr lang="da-DK" baseline="0" dirty="0"/>
+              <a:t>.</a:t>
+            </a:r>
+          </a:p>
+          <a:p>
+            <a:r>
+              <a:rPr lang="da-DK" baseline="0" dirty="0"/>
+              <a:t>Or give the </a:t>
+            </a:r>
+            <a:r>
+              <a:rPr lang="da-DK" baseline="0" dirty="0" err="1"/>
+              <a:t>thread</a:t>
+            </a:r>
+            <a:r>
+              <a:rPr lang="da-DK" baseline="0" dirty="0"/>
+              <a:t> a ”</a:t>
+            </a:r>
+            <a:r>
+              <a:rPr lang="da-DK" baseline="0" dirty="0" err="1"/>
+              <a:t>CancellationToken</a:t>
+            </a:r>
+            <a:r>
+              <a:rPr lang="da-DK" baseline="0" dirty="0"/>
+              <a:t>” </a:t>
+            </a:r>
+            <a:r>
+              <a:rPr lang="da-DK" baseline="0" dirty="0" err="1"/>
+              <a:t>object</a:t>
+            </a:r>
+            <a:r>
+              <a:rPr lang="da-DK" baseline="0" dirty="0"/>
+              <a:t> as the parameter to the </a:t>
+            </a:r>
+            <a:r>
+              <a:rPr lang="da-DK" baseline="0" dirty="0" err="1"/>
+              <a:t>myThread.Start</a:t>
+            </a:r>
+            <a:r>
+              <a:rPr lang="da-DK" baseline="0" dirty="0"/>
+              <a:t>() </a:t>
+            </a:r>
+            <a:r>
+              <a:rPr lang="da-DK" baseline="0" dirty="0" err="1"/>
+              <a:t>method</a:t>
+            </a:r>
+            <a:r>
+              <a:rPr lang="da-DK" baseline="0" dirty="0"/>
+              <a:t>.</a:t>
+            </a:r>
           </a:p>
         </p:txBody>
       </p:sp>
@@ -1454,7 +1454,7 @@
           <a:p>
             <a:fld id="{E41AB761-37ED-4EFA-99FC-D346B55B115C}" type="slidenum">
               <a:rPr lang="da-DK" smtClean="0"/>
-              <a:t>22</a:t>
+              <a:t>21</a:t>
             </a:fld>
             <a:endParaRPr lang="da-DK"/>
           </a:p>
@@ -1463,7 +1463,7 @@
     </p:spTree>
     <p:extLst>
       <p:ext uri="{BB962C8B-B14F-4D97-AF65-F5344CB8AC3E}">
-        <p14:creationId xmlns:p14="http://schemas.microsoft.com/office/powerpoint/2010/main" val="3221230666"/>
+        <p14:creationId xmlns:p14="http://schemas.microsoft.com/office/powerpoint/2010/main" val="1775698752"/>
       </p:ext>
     </p:extLst>
   </p:cSld>
@@ -1538,7 +1538,7 @@
           <a:p>
             <a:fld id="{E41AB761-37ED-4EFA-99FC-D346B55B115C}" type="slidenum">
               <a:rPr lang="da-DK" smtClean="0"/>
-              <a:t>23</a:t>
+              <a:t>22</a:t>
             </a:fld>
             <a:endParaRPr lang="da-DK"/>
           </a:p>
@@ -1547,7 +1547,7 @@
     </p:spTree>
     <p:extLst>
       <p:ext uri="{BB962C8B-B14F-4D97-AF65-F5344CB8AC3E}">
-        <p14:creationId xmlns:p14="http://schemas.microsoft.com/office/powerpoint/2010/main" val="3748348642"/>
+        <p14:creationId xmlns:p14="http://schemas.microsoft.com/office/powerpoint/2010/main" val="3221230666"/>
       </p:ext>
     </p:extLst>
   </p:cSld>
@@ -1601,130 +1601,7 @@
           <a:bodyPr/>
           <a:lstStyle/>
           <a:p>
-            <a:r>
-              <a:rPr lang="da-DK" dirty="0" err="1"/>
-              <a:t>You</a:t>
-            </a:r>
-            <a:r>
-              <a:rPr lang="da-DK" dirty="0"/>
-              <a:t> </a:t>
-            </a:r>
-            <a:r>
-              <a:rPr lang="da-DK" dirty="0" err="1"/>
-              <a:t>can</a:t>
-            </a:r>
-            <a:r>
-              <a:rPr lang="da-DK" dirty="0"/>
-              <a:t> run </a:t>
-            </a:r>
-            <a:r>
-              <a:rPr lang="da-DK" dirty="0" err="1"/>
-              <a:t>into</a:t>
-            </a:r>
-            <a:r>
-              <a:rPr lang="da-DK" dirty="0"/>
-              <a:t> </a:t>
-            </a:r>
-            <a:r>
-              <a:rPr lang="da-DK" dirty="0" err="1"/>
-              <a:t>strange</a:t>
-            </a:r>
-            <a:r>
-              <a:rPr lang="da-DK" dirty="0"/>
-              <a:t> </a:t>
-            </a:r>
-            <a:r>
-              <a:rPr lang="da-DK" dirty="0" err="1"/>
-              <a:t>behavior</a:t>
-            </a:r>
-            <a:r>
-              <a:rPr lang="da-DK" baseline="0" dirty="0"/>
-              <a:t> and </a:t>
-            </a:r>
-            <a:r>
-              <a:rPr lang="da-DK" baseline="0" dirty="0" err="1"/>
-              <a:t>thread</a:t>
-            </a:r>
-            <a:r>
-              <a:rPr lang="da-DK" baseline="0" dirty="0"/>
-              <a:t> </a:t>
-            </a:r>
-            <a:r>
-              <a:rPr lang="da-DK" baseline="0" dirty="0" err="1"/>
-              <a:t>starvation</a:t>
-            </a:r>
-            <a:r>
-              <a:rPr lang="da-DK" baseline="0" dirty="0"/>
-              <a:t>.</a:t>
-            </a:r>
-            <a:endParaRPr lang="da-DK" dirty="0"/>
-          </a:p>
-          <a:p>
-            <a:r>
-              <a:rPr lang="da-DK" dirty="0"/>
-              <a:t>But </a:t>
-            </a:r>
-            <a:r>
-              <a:rPr lang="da-DK" dirty="0" err="1"/>
-              <a:t>if</a:t>
-            </a:r>
-            <a:r>
-              <a:rPr lang="da-DK" dirty="0"/>
-              <a:t> </a:t>
-            </a:r>
-            <a:r>
-              <a:rPr lang="da-DK" dirty="0" err="1"/>
-              <a:t>you</a:t>
-            </a:r>
-            <a:r>
-              <a:rPr lang="da-DK" dirty="0"/>
-              <a:t> </a:t>
-            </a:r>
-            <a:r>
-              <a:rPr lang="da-DK" dirty="0" err="1"/>
-              <a:t>write</a:t>
-            </a:r>
-            <a:r>
-              <a:rPr lang="da-DK" dirty="0"/>
-              <a:t> software</a:t>
-            </a:r>
-            <a:r>
-              <a:rPr lang="da-DK" baseline="0" dirty="0"/>
-              <a:t> with realtime </a:t>
-            </a:r>
-            <a:r>
-              <a:rPr lang="da-DK" baseline="0" dirty="0" err="1"/>
-              <a:t>requirements</a:t>
-            </a:r>
-            <a:r>
-              <a:rPr lang="da-DK" baseline="0" dirty="0"/>
-              <a:t>, it is </a:t>
-            </a:r>
-            <a:r>
-              <a:rPr lang="da-DK" baseline="0" dirty="0" err="1"/>
-              <a:t>essential</a:t>
-            </a:r>
-            <a:r>
-              <a:rPr lang="da-DK" baseline="0" dirty="0"/>
-              <a:t> to </a:t>
-            </a:r>
-            <a:r>
-              <a:rPr lang="da-DK" baseline="0" dirty="0" err="1"/>
-              <a:t>consider</a:t>
-            </a:r>
-            <a:r>
-              <a:rPr lang="da-DK" baseline="0" dirty="0"/>
-              <a:t> </a:t>
-            </a:r>
-            <a:r>
-              <a:rPr lang="da-DK" baseline="0" dirty="0" err="1"/>
-              <a:t>priorities</a:t>
-            </a:r>
-            <a:r>
-              <a:rPr lang="da-DK" baseline="0" dirty="0"/>
-              <a:t>.</a:t>
-            </a:r>
-            <a:endParaRPr lang="da-DK" dirty="0"/>
+            <a:endParaRPr lang="da-DK" baseline="0" dirty="0"/>
           </a:p>
         </p:txBody>
       </p:sp>
@@ -1745,6 +1622,213 @@
           <a:p>
             <a:fld id="{E41AB761-37ED-4EFA-99FC-D346B55B115C}" type="slidenum">
               <a:rPr lang="da-DK" smtClean="0"/>
+              <a:t>23</a:t>
+            </a:fld>
+            <a:endParaRPr lang="da-DK"/>
+          </a:p>
+        </p:txBody>
+      </p:sp>
+    </p:spTree>
+    <p:extLst>
+      <p:ext uri="{BB962C8B-B14F-4D97-AF65-F5344CB8AC3E}">
+        <p14:creationId xmlns:p14="http://schemas.microsoft.com/office/powerpoint/2010/main" val="3748348642"/>
+      </p:ext>
+    </p:extLst>
+  </p:cSld>
+  <p:clrMapOvr>
+    <a:masterClrMapping/>
+  </p:clrMapOvr>
+</p:notes>
+</file>
+
+<file path=ppt/notesSlides/notesSlide18.xml><?xml version="1.0" encoding="utf-8"?>
+<p:notes xmlns:a="http://schemas.openxmlformats.org/drawingml/2006/main" xmlns:r="http://schemas.openxmlformats.org/officeDocument/2006/relationships" xmlns:p="http://schemas.openxmlformats.org/presentationml/2006/main">
+  <p:cSld>
+    <p:spTree>
+      <p:nvGrpSpPr>
+        <p:cNvPr id="1" name=""/>
+        <p:cNvGrpSpPr/>
+        <p:nvPr/>
+      </p:nvGrpSpPr>
+      <p:grpSpPr>
+        <a:xfrm>
+          <a:off x="0" y="0"/>
+          <a:ext cx="0" cy="0"/>
+          <a:chOff x="0" y="0"/>
+          <a:chExt cx="0" cy="0"/>
+        </a:xfrm>
+      </p:grpSpPr>
+      <p:sp>
+        <p:nvSpPr>
+          <p:cNvPr id="2" name="Slide Image Placeholder 1"/>
+          <p:cNvSpPr>
+            <a:spLocks noGrp="1" noRot="1" noChangeAspect="1"/>
+          </p:cNvSpPr>
+          <p:nvPr>
+            <p:ph type="sldImg"/>
+          </p:nvPr>
+        </p:nvSpPr>
+        <p:spPr/>
+      </p:sp>
+      <p:sp>
+        <p:nvSpPr>
+          <p:cNvPr id="3" name="Notes Placeholder 2"/>
+          <p:cNvSpPr>
+            <a:spLocks noGrp="1"/>
+          </p:cNvSpPr>
+          <p:nvPr>
+            <p:ph type="body" idx="1"/>
+          </p:nvPr>
+        </p:nvSpPr>
+        <p:spPr/>
+        <p:txBody>
+          <a:bodyPr/>
+          <a:lstStyle/>
+          <a:p>
+            <a:r>
+              <a:rPr lang="da-DK" dirty="0" err="1"/>
+              <a:t>You</a:t>
+            </a:r>
+            <a:r>
+              <a:rPr lang="da-DK" dirty="0"/>
+              <a:t> </a:t>
+            </a:r>
+            <a:r>
+              <a:rPr lang="da-DK" dirty="0" err="1"/>
+              <a:t>can</a:t>
+            </a:r>
+            <a:r>
+              <a:rPr lang="da-DK" dirty="0"/>
+              <a:t> run </a:t>
+            </a:r>
+            <a:r>
+              <a:rPr lang="da-DK" dirty="0" err="1"/>
+              <a:t>into</a:t>
+            </a:r>
+            <a:r>
+              <a:rPr lang="da-DK" dirty="0"/>
+              <a:t> </a:t>
+            </a:r>
+            <a:r>
+              <a:rPr lang="da-DK" dirty="0" err="1"/>
+              <a:t>strange</a:t>
+            </a:r>
+            <a:r>
+              <a:rPr lang="da-DK" dirty="0"/>
+              <a:t> </a:t>
+            </a:r>
+            <a:r>
+              <a:rPr lang="da-DK" dirty="0" err="1"/>
+              <a:t>behavior</a:t>
+            </a:r>
+            <a:r>
+              <a:rPr lang="da-DK" baseline="0" dirty="0"/>
+              <a:t> and </a:t>
+            </a:r>
+            <a:r>
+              <a:rPr lang="da-DK" baseline="0" dirty="0" err="1"/>
+              <a:t>thread</a:t>
+            </a:r>
+            <a:r>
+              <a:rPr lang="da-DK" baseline="0" dirty="0"/>
+              <a:t> </a:t>
+            </a:r>
+            <a:r>
+              <a:rPr lang="da-DK" baseline="0" dirty="0" err="1"/>
+              <a:t>starvation</a:t>
+            </a:r>
+            <a:r>
+              <a:rPr lang="da-DK" baseline="0" dirty="0"/>
+              <a:t>.</a:t>
+            </a:r>
+            <a:endParaRPr lang="da-DK" dirty="0"/>
+          </a:p>
+          <a:p>
+            <a:r>
+              <a:rPr lang="da-DK" dirty="0"/>
+              <a:t>But </a:t>
+            </a:r>
+            <a:r>
+              <a:rPr lang="da-DK" dirty="0" err="1"/>
+              <a:t>if</a:t>
+            </a:r>
+            <a:r>
+              <a:rPr lang="da-DK" dirty="0"/>
+              <a:t> </a:t>
+            </a:r>
+            <a:r>
+              <a:rPr lang="da-DK" dirty="0" err="1"/>
+              <a:t>you</a:t>
+            </a:r>
+            <a:r>
+              <a:rPr lang="da-DK" dirty="0"/>
+              <a:t> </a:t>
+            </a:r>
+            <a:r>
+              <a:rPr lang="da-DK" dirty="0" err="1"/>
+              <a:t>write</a:t>
+            </a:r>
+            <a:r>
+              <a:rPr lang="da-DK" dirty="0"/>
+              <a:t> software</a:t>
+            </a:r>
+            <a:r>
+              <a:rPr lang="da-DK" baseline="0" dirty="0"/>
+              <a:t> with realtime </a:t>
+            </a:r>
+            <a:r>
+              <a:rPr lang="da-DK" baseline="0" dirty="0" err="1"/>
+              <a:t>requirements</a:t>
+            </a:r>
+            <a:r>
+              <a:rPr lang="da-DK" baseline="0" dirty="0"/>
+              <a:t>, it is </a:t>
+            </a:r>
+            <a:r>
+              <a:rPr lang="da-DK" baseline="0" dirty="0" err="1"/>
+              <a:t>essential</a:t>
+            </a:r>
+            <a:r>
+              <a:rPr lang="da-DK" baseline="0" dirty="0"/>
+              <a:t> to </a:t>
+            </a:r>
+            <a:r>
+              <a:rPr lang="da-DK" baseline="0" dirty="0" err="1"/>
+              <a:t>consider</a:t>
+            </a:r>
+            <a:r>
+              <a:rPr lang="da-DK" baseline="0" dirty="0"/>
+              <a:t> </a:t>
+            </a:r>
+            <a:r>
+              <a:rPr lang="da-DK" baseline="0" dirty="0" err="1"/>
+              <a:t>priorities</a:t>
+            </a:r>
+            <a:r>
+              <a:rPr lang="da-DK" baseline="0" dirty="0"/>
+              <a:t>.</a:t>
+            </a:r>
+            <a:endParaRPr lang="da-DK" dirty="0"/>
+          </a:p>
+        </p:txBody>
+      </p:sp>
+      <p:sp>
+        <p:nvSpPr>
+          <p:cNvPr id="4" name="Slide Number Placeholder 3"/>
+          <p:cNvSpPr>
+            <a:spLocks noGrp="1"/>
+          </p:cNvSpPr>
+          <p:nvPr>
+            <p:ph type="sldNum" sz="quarter" idx="10"/>
+          </p:nvPr>
+        </p:nvSpPr>
+        <p:spPr/>
+        <p:txBody>
+          <a:bodyPr/>
+          <a:lstStyle/>
+          <a:p>
+            <a:fld id="{E41AB761-37ED-4EFA-99FC-D346B55B115C}" type="slidenum">
+              <a:rPr lang="da-DK" smtClean="0"/>
               <a:t>24</a:t>
             </a:fld>
             <a:endParaRPr lang="da-DK"/>
@@ -1764,7 +1848,7 @@
 </p:notes>
 </file>
 
-<file path=ppt/notesSlides/notesSlide18.xml><?xml version="1.0" encoding="utf-8"?>
+<file path=ppt/notesSlides/notesSlide19.xml><?xml version="1.0" encoding="utf-8"?>
 <p:notes xmlns:a="http://schemas.openxmlformats.org/drawingml/2006/main" xmlns:r="http://schemas.openxmlformats.org/officeDocument/2006/relationships" xmlns:p="http://schemas.openxmlformats.org/presentationml/2006/main">
   <p:cSld>
     <p:spTree>
@@ -2331,50 +2415,7 @@
           <a:bodyPr/>
           <a:lstStyle/>
           <a:p>
-            <a:r>
-              <a:rPr lang="da-DK" dirty="0"/>
-              <a:t>I have a </a:t>
-            </a:r>
-            <a:r>
-              <a:rPr lang="da-DK" dirty="0" err="1"/>
-              <a:t>method</a:t>
-            </a:r>
-            <a:r>
-              <a:rPr lang="da-DK" dirty="0"/>
-              <a:t> </a:t>
-            </a:r>
-            <a:r>
-              <a:rPr lang="da-DK" dirty="0" err="1"/>
-              <a:t>that</a:t>
-            </a:r>
-            <a:r>
-              <a:rPr lang="da-DK" dirty="0"/>
-              <a:t> </a:t>
-            </a:r>
-            <a:r>
-              <a:rPr lang="da-DK" dirty="0" err="1"/>
-              <a:t>does</a:t>
-            </a:r>
-            <a:r>
-              <a:rPr lang="da-DK" dirty="0"/>
-              <a:t> a </a:t>
-            </a:r>
-            <a:r>
-              <a:rPr lang="da-DK" dirty="0" err="1"/>
-              <a:t>lot</a:t>
-            </a:r>
-            <a:r>
-              <a:rPr lang="da-DK" dirty="0"/>
-              <a:t> of </a:t>
-            </a:r>
-            <a:r>
-              <a:rPr lang="da-DK" dirty="0" err="1"/>
-              <a:t>work</a:t>
-            </a:r>
-            <a:r>
-              <a:rPr lang="da-DK" dirty="0"/>
-              <a:t>.</a:t>
-            </a:r>
+            <a:endParaRPr lang="da-DK" dirty="0"/>
           </a:p>
         </p:txBody>
       </p:sp>
@@ -2385,7 +2426,7 @@
             <a:spLocks noGrp="1"/>
           </p:cNvSpPr>
           <p:nvPr>
-            <p:ph type="sldNum" sz="quarter" idx="10"/>
+            <p:ph type="sldNum" sz="quarter" idx="5"/>
           </p:nvPr>
         </p:nvSpPr>
         <p:spPr/>
@@ -2395,7 +2436,7 @@
           <a:p>
             <a:fld id="{E41AB761-37ED-4EFA-99FC-D346B55B115C}" type="slidenum">
               <a:rPr lang="da-DK" smtClean="0"/>
-              <a:t>7</a:t>
+              <a:t>5</a:t>
             </a:fld>
             <a:endParaRPr lang="da-DK"/>
           </a:p>
@@ -2404,7 +2445,7 @@
     </p:spTree>
     <p:extLst>
       <p:ext uri="{BB962C8B-B14F-4D97-AF65-F5344CB8AC3E}">
-        <p14:creationId xmlns:p14="http://schemas.microsoft.com/office/powerpoint/2010/main" val="1699908620"/>
+        <p14:creationId xmlns:p14="http://schemas.microsoft.com/office/powerpoint/2010/main" val="2253198494"/>
       </p:ext>
     </p:extLst>
   </p:cSld>
@@ -2460,15 +2501,15 @@
           <a:p>
             <a:r>
               <a:rPr lang="da-DK" dirty="0"/>
-              <a:t>So </a:t>
+              <a:t>I have a </a:t>
             </a:r>
             <a:r>
               <a:rPr lang="da-DK" dirty="0" err="1"/>
-              <a:t>lets</a:t>
+              <a:t>method</a:t>
             </a:r>
             <a:r>
               <a:rPr lang="da-DK" dirty="0"/>
-              <a:t> run </a:t>
+              <a:t> </a:t>
             </a:r>
             <a:r>
               <a:rPr lang="da-DK" dirty="0" err="1"/>
@@ -2480,41 +2521,28 @@
             </a:r>
             <a:r>
               <a:rPr lang="da-DK" dirty="0" err="1"/>
-              <a:t>method</a:t>
+              <a:t>does</a:t>
             </a:r>
             <a:r>
               <a:rPr lang="da-DK" dirty="0"/>
-              <a:t> on</a:t>
-            </a:r>
-            <a:r>
-              <a:rPr lang="da-DK" baseline="0" dirty="0"/>
-              <a:t> </a:t>
-            </a:r>
-            <a:r>
-              <a:rPr lang="da-DK" baseline="0" dirty="0" err="1"/>
-              <a:t>its</a:t>
-            </a:r>
-            <a:r>
-              <a:rPr lang="da-DK" baseline="0" dirty="0"/>
-              <a:t> </a:t>
-            </a:r>
-            <a:r>
-              <a:rPr lang="da-DK" baseline="0" dirty="0" err="1"/>
-              <a:t>own</a:t>
-            </a:r>
-            <a:r>
-              <a:rPr lang="da-DK" baseline="0" dirty="0"/>
-              <a:t> </a:t>
-            </a:r>
-            <a:r>
-              <a:rPr lang="da-DK" baseline="0" dirty="0" err="1"/>
-              <a:t>thread</a:t>
-            </a:r>
-            <a:r>
-              <a:rPr lang="da-DK" baseline="0" dirty="0"/>
+              <a:t> a </a:t>
+            </a:r>
+            <a:r>
+              <a:rPr lang="da-DK" dirty="0" err="1"/>
+              <a:t>lot</a:t>
+            </a:r>
+            <a:r>
+              <a:rPr lang="da-DK" dirty="0"/>
+              <a:t> of </a:t>
+            </a:r>
+            <a:r>
+              <a:rPr lang="da-DK" dirty="0" err="1"/>
+              <a:t>work</a:t>
+            </a:r>
+            <a:r>
+              <a:rPr lang="da-DK" dirty="0"/>
               <a:t>.</a:t>
             </a:r>
-            <a:endParaRPr lang="da-DK" dirty="0"/>
           </a:p>
         </p:txBody>
       </p:sp>
@@ -2535,7 +2563,7 @@
           <a:p>
             <a:fld id="{E41AB761-37ED-4EFA-99FC-D346B55B115C}" type="slidenum">
               <a:rPr lang="da-DK" smtClean="0"/>
-              <a:t>8</a:t>
+              <a:t>7</a:t>
             </a:fld>
             <a:endParaRPr lang="da-DK"/>
           </a:p>
@@ -2544,7 +2572,7 @@
     </p:spTree>
     <p:extLst>
       <p:ext uri="{BB962C8B-B14F-4D97-AF65-F5344CB8AC3E}">
-        <p14:creationId xmlns:p14="http://schemas.microsoft.com/office/powerpoint/2010/main" val="722167819"/>
+        <p14:creationId xmlns:p14="http://schemas.microsoft.com/office/powerpoint/2010/main" val="1699908620"/>
       </p:ext>
     </p:extLst>
   </p:cSld>
@@ -2599,8 +2627,20 @@
           <a:lstStyle/>
           <a:p>
             <a:r>
+              <a:rPr lang="da-DK" dirty="0"/>
+              <a:t>So </a:t>
+            </a:r>
+            <a:r>
               <a:rPr lang="da-DK" dirty="0" err="1"/>
-              <a:t>We</a:t>
+              <a:t>lets</a:t>
+            </a:r>
+            <a:r>
+              <a:rPr lang="da-DK" dirty="0"/>
+              <a:t> run </a:t>
+            </a:r>
+            <a:r>
+              <a:rPr lang="da-DK" dirty="0" err="1"/>
+              <a:t>that</a:t>
             </a:r>
             <a:r>
               <a:rPr lang="da-DK" dirty="0"/>
@@ -2608,23 +2648,11 @@
             </a:r>
             <a:r>
               <a:rPr lang="da-DK" dirty="0" err="1"/>
-              <a:t>tell</a:t>
+              <a:t>method</a:t>
             </a:r>
             <a:r>
               <a:rPr lang="da-DK" dirty="0"/>
-              <a:t> the </a:t>
-            </a:r>
-            <a:r>
-              <a:rPr lang="da-DK" dirty="0" err="1"/>
-              <a:t>thread</a:t>
-            </a:r>
-            <a:r>
-              <a:rPr lang="da-DK" dirty="0"/>
-              <a:t> </a:t>
-            </a:r>
-            <a:r>
-              <a:rPr lang="da-DK" dirty="0" err="1"/>
-              <a:t>which</a:t>
+              <a:t> on</a:t>
             </a:r>
             <a:r>
               <a:rPr lang="da-DK" baseline="0" dirty="0"/>
@@ -2632,45 +2660,7 @@
             </a:r>
             <a:r>
               <a:rPr lang="da-DK" baseline="0" dirty="0" err="1"/>
-              <a:t>method</a:t>
-            </a:r>
-            <a:r>
-              <a:rPr lang="da-DK" baseline="0" dirty="0"/>
-              <a:t> to run, by </a:t>
-            </a:r>
-            <a:r>
-              <a:rPr lang="da-DK" baseline="0" dirty="0" err="1"/>
-              <a:t>giving</a:t>
-            </a:r>
-            <a:r>
-              <a:rPr lang="da-DK" baseline="0" dirty="0"/>
-              <a:t> it the </a:t>
-            </a:r>
-            <a:r>
-              <a:rPr lang="da-DK" baseline="0" dirty="0" err="1"/>
-              <a:t>method</a:t>
-            </a:r>
-            <a:r>
-              <a:rPr lang="da-DK" baseline="0" dirty="0"/>
-              <a:t> in the </a:t>
-            </a:r>
-            <a:r>
-              <a:rPr lang="da-DK" baseline="0" dirty="0" err="1"/>
-              <a:t>constructor</a:t>
-            </a:r>
-            <a:r>
-              <a:rPr lang="da-DK" baseline="0" dirty="0"/>
-              <a:t>.</a:t>
-            </a:r>
-          </a:p>
-          <a:p>
-            <a:r>
-              <a:rPr lang="da-DK" baseline="0" dirty="0"/>
-              <a:t>The </a:t>
-            </a:r>
-            <a:r>
-              <a:rPr lang="da-DK" baseline="0" dirty="0" err="1"/>
-              <a:t>method</a:t>
+              <a:t>its</a:t>
             </a:r>
             <a:r>
               <a:rPr lang="da-DK" baseline="0" dirty="0"/>
@@ -2678,7 +2668,7 @@
             </a:r>
             <a:r>
               <a:rPr lang="da-DK" baseline="0" dirty="0" err="1"/>
-              <a:t>will</a:t>
+              <a:t>own</a:t>
             </a:r>
             <a:r>
               <a:rPr lang="da-DK" baseline="0" dirty="0"/>
@@ -2686,31 +2676,7 @@
             </a:r>
             <a:r>
               <a:rPr lang="da-DK" baseline="0" dirty="0" err="1"/>
-              <a:t>be</a:t>
-            </a:r>
-            <a:r>
-              <a:rPr lang="da-DK" baseline="0" dirty="0"/>
-              <a:t> run, </a:t>
-            </a:r>
-            <a:r>
-              <a:rPr lang="da-DK" baseline="0" dirty="0" err="1"/>
-              <a:t>when</a:t>
-            </a:r>
-            <a:r>
-              <a:rPr lang="da-DK" baseline="0" dirty="0"/>
-              <a:t> the </a:t>
-            </a:r>
-            <a:r>
-              <a:rPr lang="da-DK" baseline="0" dirty="0" err="1"/>
               <a:t>thread</a:t>
-            </a:r>
-            <a:r>
-              <a:rPr lang="da-DK" baseline="0" dirty="0"/>
-              <a:t> is </a:t>
-            </a:r>
-            <a:r>
-              <a:rPr lang="da-DK" baseline="0" dirty="0" err="1"/>
-              <a:t>started</a:t>
             </a:r>
             <a:r>
               <a:rPr lang="da-DK" baseline="0" dirty="0"/>
@@ -2737,7 +2703,7 @@
           <a:p>
             <a:fld id="{E41AB761-37ED-4EFA-99FC-D346B55B115C}" type="slidenum">
               <a:rPr lang="da-DK" smtClean="0"/>
-              <a:t>9</a:t>
+              <a:t>8</a:t>
             </a:fld>
             <a:endParaRPr lang="da-DK"/>
           </a:p>
@@ -2746,7 +2712,7 @@
     </p:spTree>
     <p:extLst>
       <p:ext uri="{BB962C8B-B14F-4D97-AF65-F5344CB8AC3E}">
-        <p14:creationId xmlns:p14="http://schemas.microsoft.com/office/powerpoint/2010/main" val="2630088548"/>
+        <p14:creationId xmlns:p14="http://schemas.microsoft.com/office/powerpoint/2010/main" val="722167819"/>
       </p:ext>
     </p:extLst>
   </p:cSld>
@@ -2801,12 +2767,8 @@
           <a:lstStyle/>
           <a:p>
             <a:r>
-              <a:rPr lang="da-DK" dirty="0"/>
-              <a:t>Parameters to the </a:t>
-            </a:r>
-            <a:r>
               <a:rPr lang="da-DK" dirty="0" err="1"/>
-              <a:t>LotsOfWork</a:t>
+              <a:t>We</a:t>
             </a:r>
             <a:r>
               <a:rPr lang="da-DK" dirty="0"/>
@@ -2814,7 +2776,23 @@
             </a:r>
             <a:r>
               <a:rPr lang="da-DK" dirty="0" err="1"/>
-              <a:t>instance</a:t>
+              <a:t>tell</a:t>
+            </a:r>
+            <a:r>
+              <a:rPr lang="da-DK" dirty="0"/>
+              <a:t> the </a:t>
+            </a:r>
+            <a:r>
+              <a:rPr lang="da-DK" dirty="0" err="1"/>
+              <a:t>thread</a:t>
+            </a:r>
+            <a:r>
+              <a:rPr lang="da-DK" dirty="0"/>
+              <a:t> </a:t>
+            </a:r>
+            <a:r>
+              <a:rPr lang="da-DK" dirty="0" err="1"/>
+              <a:t>which</a:t>
             </a:r>
             <a:r>
               <a:rPr lang="da-DK" baseline="0" dirty="0"/>
@@ -2822,7 +2800,45 @@
             </a:r>
             <a:r>
               <a:rPr lang="da-DK" baseline="0" dirty="0" err="1"/>
-              <a:t>can</a:t>
+              <a:t>method</a:t>
+            </a:r>
+            <a:r>
+              <a:rPr lang="da-DK" baseline="0" dirty="0"/>
+              <a:t> to run, by </a:t>
+            </a:r>
+            <a:r>
+              <a:rPr lang="da-DK" baseline="0" dirty="0" err="1"/>
+              <a:t>giving</a:t>
+            </a:r>
+            <a:r>
+              <a:rPr lang="da-DK" baseline="0" dirty="0"/>
+              <a:t> it the </a:t>
+            </a:r>
+            <a:r>
+              <a:rPr lang="da-DK" baseline="0" dirty="0" err="1"/>
+              <a:t>method</a:t>
+            </a:r>
+            <a:r>
+              <a:rPr lang="da-DK" baseline="0" dirty="0"/>
+              <a:t> in the </a:t>
+            </a:r>
+            <a:r>
+              <a:rPr lang="da-DK" baseline="0" dirty="0" err="1"/>
+              <a:t>constructor</a:t>
+            </a:r>
+            <a:r>
+              <a:rPr lang="da-DK" baseline="0" dirty="0"/>
+              <a:t>.</a:t>
+            </a:r>
+          </a:p>
+          <a:p>
+            <a:r>
+              <a:rPr lang="da-DK" baseline="0" dirty="0"/>
+              <a:t>The </a:t>
+            </a:r>
+            <a:r>
+              <a:rPr lang="da-DK" baseline="0" dirty="0" err="1"/>
+              <a:t>method</a:t>
             </a:r>
             <a:r>
               <a:rPr lang="da-DK" baseline="0" dirty="0"/>
@@ -2830,11 +2846,43 @@
             </a:r>
             <a:r>
               <a:rPr lang="da-DK" baseline="0" dirty="0" err="1"/>
+              <a:t>will</a:t>
+            </a:r>
+            <a:r>
+              <a:rPr lang="da-DK" baseline="0" dirty="0"/>
+              <a:t> </a:t>
+            </a:r>
+            <a:r>
+              <a:rPr lang="da-DK" baseline="0" dirty="0" err="1"/>
               <a:t>be</a:t>
             </a:r>
             <a:r>
               <a:rPr lang="da-DK" baseline="0" dirty="0"/>
-              <a:t> given as properties.</a:t>
+              <a:t> run, </a:t>
+            </a:r>
+            <a:r>
+              <a:rPr lang="da-DK" baseline="0" dirty="0" err="1"/>
+              <a:t>when</a:t>
+            </a:r>
+            <a:r>
+              <a:rPr lang="da-DK" baseline="0" dirty="0"/>
+              <a:t> the </a:t>
+            </a:r>
+            <a:r>
+              <a:rPr lang="da-DK" baseline="0" dirty="0" err="1"/>
+              <a:t>thread</a:t>
+            </a:r>
+            <a:r>
+              <a:rPr lang="da-DK" baseline="0" dirty="0"/>
+              <a:t> is </a:t>
+            </a:r>
+            <a:r>
+              <a:rPr lang="da-DK" baseline="0" dirty="0" err="1"/>
+              <a:t>started</a:t>
+            </a:r>
+            <a:r>
+              <a:rPr lang="da-DK" baseline="0" dirty="0"/>
+              <a:t>.</a:t>
             </a:r>
             <a:endParaRPr lang="da-DK" dirty="0"/>
           </a:p>
@@ -2857,7 +2905,7 @@
           <a:p>
             <a:fld id="{E41AB761-37ED-4EFA-99FC-D346B55B115C}" type="slidenum">
               <a:rPr lang="da-DK" smtClean="0"/>
-              <a:t>10</a:t>
+              <a:t>9</a:t>
             </a:fld>
             <a:endParaRPr lang="da-DK"/>
           </a:p>
@@ -2866,7 +2914,7 @@
     </p:spTree>
     <p:extLst>
       <p:ext uri="{BB962C8B-B14F-4D97-AF65-F5344CB8AC3E}">
-        <p14:creationId xmlns:p14="http://schemas.microsoft.com/office/powerpoint/2010/main" val="3382159284"/>
+        <p14:creationId xmlns:p14="http://schemas.microsoft.com/office/powerpoint/2010/main" val="2630088548"/>
       </p:ext>
     </p:extLst>
   </p:cSld>
@@ -2922,11 +2970,11 @@
           <a:p>
             <a:r>
               <a:rPr lang="da-DK" dirty="0"/>
-              <a:t>Or </a:t>
+              <a:t>Parameters to the </a:t>
             </a:r>
             <a:r>
               <a:rPr lang="da-DK" dirty="0" err="1"/>
-              <a:t>we</a:t>
+              <a:t>LotsOfWork</a:t>
             </a:r>
             <a:r>
               <a:rPr lang="da-DK" dirty="0"/>
@@ -2934,31 +2982,7 @@
             </a:r>
             <a:r>
               <a:rPr lang="da-DK" dirty="0" err="1"/>
-              <a:t>can</a:t>
-            </a:r>
-            <a:r>
-              <a:rPr lang="da-DK" dirty="0"/>
-              <a:t> </a:t>
-            </a:r>
-            <a:r>
-              <a:rPr lang="da-DK" dirty="0" err="1"/>
-              <a:t>pass</a:t>
-            </a:r>
-            <a:r>
-              <a:rPr lang="da-DK" baseline="0" dirty="0"/>
-              <a:t> parameters to the </a:t>
-            </a:r>
-            <a:r>
-              <a:rPr lang="da-DK" baseline="0" dirty="0" err="1"/>
-              <a:t>thread</a:t>
-            </a:r>
-            <a:r>
-              <a:rPr lang="da-DK" baseline="0" dirty="0"/>
-              <a:t>, </a:t>
-            </a:r>
-            <a:r>
-              <a:rPr lang="da-DK" baseline="0" dirty="0" err="1"/>
-              <a:t>when</a:t>
+              <a:t>instance</a:t>
             </a:r>
             <a:r>
               <a:rPr lang="da-DK" baseline="0" dirty="0"/>
@@ -2966,72 +2990,20 @@
             </a:r>
             <a:r>
               <a:rPr lang="da-DK" baseline="0" dirty="0" err="1"/>
-              <a:t>we</a:t>
+              <a:t>can</a:t>
             </a:r>
             <a:r>
               <a:rPr lang="da-DK" baseline="0" dirty="0"/>
-              <a:t> start the </a:t>
+              <a:t> </a:t>
             </a:r>
             <a:r>
               <a:rPr lang="da-DK" baseline="0" dirty="0" err="1"/>
-              <a:t>thread</a:t>
+              <a:t>be</a:t>
             </a:r>
             <a:r>
               <a:rPr lang="da-DK" baseline="0" dirty="0"/>
-              <a:t>.</a:t>
-            </a:r>
-            <a:endParaRPr lang="da-DK" dirty="0"/>
-          </a:p>
-          <a:p>
-            <a:endParaRPr lang="da-DK" dirty="0"/>
-          </a:p>
-          <a:p>
-            <a:r>
-              <a:rPr lang="da-DK" dirty="0"/>
-              <a:t>NOTE: </a:t>
-            </a:r>
-            <a:r>
-              <a:rPr lang="da-DK" dirty="0" err="1"/>
-              <a:t>We</a:t>
-            </a:r>
-            <a:r>
-              <a:rPr lang="da-DK" dirty="0"/>
-              <a:t> </a:t>
-            </a:r>
-            <a:r>
-              <a:rPr lang="da-DK" dirty="0" err="1"/>
-              <a:t>could</a:t>
-            </a:r>
-            <a:r>
-              <a:rPr lang="da-DK" dirty="0"/>
-              <a:t> </a:t>
-            </a:r>
-            <a:r>
-              <a:rPr lang="da-DK" dirty="0" err="1"/>
-              <a:t>also</a:t>
-            </a:r>
-            <a:r>
-              <a:rPr lang="da-DK" dirty="0"/>
-              <a:t> </a:t>
-            </a:r>
-            <a:r>
-              <a:rPr lang="da-DK" dirty="0" err="1"/>
-              <a:t>use</a:t>
-            </a:r>
-            <a:r>
-              <a:rPr lang="da-DK" dirty="0"/>
-              <a:t> lambda </a:t>
-            </a:r>
-            <a:r>
-              <a:rPr lang="da-DK" dirty="0" err="1"/>
-              <a:t>expressions</a:t>
-            </a:r>
-            <a:r>
-              <a:rPr lang="da-DK" dirty="0"/>
-              <a:t> https://stackoverflow.com/questions/1195896/threadstart-with-parameters</a:t>
-            </a:r>
-          </a:p>
-          <a:p>
+              <a:t> given as properties.</a:t>
+            </a:r>
             <a:endParaRPr lang="da-DK" dirty="0"/>
           </a:p>
         </p:txBody>
@@ -3053,7 +3025,7 @@
           <a:p>
             <a:fld id="{E41AB761-37ED-4EFA-99FC-D346B55B115C}" type="slidenum">
               <a:rPr lang="da-DK" smtClean="0"/>
-              <a:t>11</a:t>
+              <a:t>10</a:t>
             </a:fld>
             <a:endParaRPr lang="da-DK"/>
           </a:p>
@@ -3062,7 +3034,7 @@
     </p:spTree>
     <p:extLst>
       <p:ext uri="{BB962C8B-B14F-4D97-AF65-F5344CB8AC3E}">
-        <p14:creationId xmlns:p14="http://schemas.microsoft.com/office/powerpoint/2010/main" val="2997411116"/>
+        <p14:creationId xmlns:p14="http://schemas.microsoft.com/office/powerpoint/2010/main" val="3382159284"/>
       </p:ext>
     </p:extLst>
   </p:cSld>
@@ -3116,6 +3088,118 @@
           <a:bodyPr/>
           <a:lstStyle/>
           <a:p>
+            <a:r>
+              <a:rPr lang="da-DK" dirty="0"/>
+              <a:t>Or </a:t>
+            </a:r>
+            <a:r>
+              <a:rPr lang="da-DK" dirty="0" err="1"/>
+              <a:t>we</a:t>
+            </a:r>
+            <a:r>
+              <a:rPr lang="da-DK" dirty="0"/>
+              <a:t> </a:t>
+            </a:r>
+            <a:r>
+              <a:rPr lang="da-DK" dirty="0" err="1"/>
+              <a:t>can</a:t>
+            </a:r>
+            <a:r>
+              <a:rPr lang="da-DK" dirty="0"/>
+              <a:t> </a:t>
+            </a:r>
+            <a:r>
+              <a:rPr lang="da-DK" dirty="0" err="1"/>
+              <a:t>pass</a:t>
+            </a:r>
+            <a:r>
+              <a:rPr lang="da-DK" baseline="0" dirty="0"/>
+              <a:t> parameters to the </a:t>
+            </a:r>
+            <a:r>
+              <a:rPr lang="da-DK" baseline="0" dirty="0" err="1"/>
+              <a:t>thread</a:t>
+            </a:r>
+            <a:r>
+              <a:rPr lang="da-DK" baseline="0" dirty="0"/>
+              <a:t>, </a:t>
+            </a:r>
+            <a:r>
+              <a:rPr lang="da-DK" baseline="0" dirty="0" err="1"/>
+              <a:t>when</a:t>
+            </a:r>
+            <a:r>
+              <a:rPr lang="da-DK" baseline="0" dirty="0"/>
+              <a:t> </a:t>
+            </a:r>
+            <a:r>
+              <a:rPr lang="da-DK" baseline="0" dirty="0" err="1"/>
+              <a:t>we</a:t>
+            </a:r>
+            <a:r>
+              <a:rPr lang="da-DK" baseline="0" dirty="0"/>
+              <a:t> start the </a:t>
+            </a:r>
+            <a:r>
+              <a:rPr lang="da-DK" baseline="0" dirty="0" err="1"/>
+              <a:t>thread</a:t>
+            </a:r>
+            <a:r>
+              <a:rPr lang="da-DK" baseline="0" dirty="0"/>
+              <a:t>.</a:t>
+            </a:r>
+            <a:endParaRPr lang="da-DK" dirty="0"/>
+          </a:p>
+          <a:p>
+            <a:endParaRPr lang="da-DK" dirty="0"/>
+          </a:p>
+          <a:p>
+            <a:r>
+              <a:rPr lang="da-DK" dirty="0"/>
+              <a:t>NOTE: </a:t>
+            </a:r>
+            <a:r>
+              <a:rPr lang="da-DK" dirty="0" err="1"/>
+              <a:t>We</a:t>
+            </a:r>
+            <a:r>
+              <a:rPr lang="da-DK" dirty="0"/>
+              <a:t> </a:t>
+            </a:r>
+            <a:r>
+              <a:rPr lang="da-DK" dirty="0" err="1"/>
+              <a:t>could</a:t>
+            </a:r>
+            <a:r>
+              <a:rPr lang="da-DK" dirty="0"/>
+              <a:t> </a:t>
+            </a:r>
+            <a:r>
+              <a:rPr lang="da-DK" dirty="0" err="1"/>
+              <a:t>also</a:t>
+            </a:r>
+            <a:r>
+              <a:rPr lang="da-DK" dirty="0"/>
+              <a:t> </a:t>
+            </a:r>
+            <a:r>
+              <a:rPr lang="da-DK" dirty="0" err="1"/>
+              <a:t>use</a:t>
+            </a:r>
+            <a:r>
+              <a:rPr lang="da-DK" dirty="0"/>
+              <a:t> lambda </a:t>
+            </a:r>
+            <a:r>
+              <a:rPr lang="da-DK" dirty="0" err="1"/>
+              <a:t>expressions</a:t>
+            </a:r>
+            <a:r>
+              <a:rPr lang="da-DK" dirty="0"/>
+              <a:t> https://stackoverflow.com/questions/1195896/threadstart-with-parameters</a:t>
+            </a:r>
+          </a:p>
+          <a:p>
             <a:endParaRPr lang="da-DK" dirty="0"/>
           </a:p>
         </p:txBody>
@@ -3137,7 +3221,7 @@
           <a:p>
             <a:fld id="{E41AB761-37ED-4EFA-99FC-D346B55B115C}" type="slidenum">
               <a:rPr lang="da-DK" smtClean="0"/>
-              <a:t>12</a:t>
+              <a:t>11</a:t>
             </a:fld>
             <a:endParaRPr lang="da-DK"/>
           </a:p>
@@ -3146,7 +3230,7 @@
     </p:spTree>
     <p:extLst>
       <p:ext uri="{BB962C8B-B14F-4D97-AF65-F5344CB8AC3E}">
-        <p14:creationId xmlns:p14="http://schemas.microsoft.com/office/powerpoint/2010/main" val="1946887577"/>
+        <p14:creationId xmlns:p14="http://schemas.microsoft.com/office/powerpoint/2010/main" val="2997411116"/>
       </p:ext>
     </p:extLst>
   </p:cSld>
@@ -17755,7 +17839,7 @@
           <p:nvPr/>
         </p:nvPicPr>
         <p:blipFill>
-          <a:blip r:embed="rId2"/>
+          <a:blip r:embed="rId3"/>
           <a:stretch>
             <a:fillRect/>
           </a:stretch>
@@ -17772,10 +17856,10 @@
       </p:pic>
       <p:pic>
         <p:nvPicPr>
-          <p:cNvPr id="3" name="Picture 2">
+          <p:cNvPr id="4" name="Picture 3">
             <a:extLst>
               <a:ext uri="{FF2B5EF4-FFF2-40B4-BE49-F238E27FC236}">
-                <a16:creationId xmlns:a16="http://schemas.microsoft.com/office/drawing/2014/main" id="{1CE9F7EC-E54B-E58F-1309-2FBE114103EF}"/>
+                <a16:creationId xmlns:a16="http://schemas.microsoft.com/office/drawing/2014/main" id="{010B7652-9B9E-1E1F-F215-B8B34F42D3EA}"/>
               </a:ext>
             </a:extLst>
           </p:cNvPr>
@@ -17785,15 +17869,45 @@
           <p:nvPr/>
         </p:nvPicPr>
         <p:blipFill>
-          <a:blip r:embed="rId3"/>
+          <a:blip r:embed="rId4"/>
           <a:stretch>
             <a:fillRect/>
           </a:stretch>
         </p:blipFill>
         <p:spPr>
           <a:xfrm>
-            <a:off x="2337863" y="2240249"/>
-            <a:ext cx="7516274" cy="1247949"/>
+            <a:off x="1202849" y="1879650"/>
+            <a:ext cx="9786303" cy="1579180"/>
+          </a:xfrm>
+          <a:prstGeom prst="rect">
+            <a:avLst/>
+          </a:prstGeom>
+        </p:spPr>
+      </p:pic>
+      <p:pic>
+        <p:nvPicPr>
+          <p:cNvPr id="6" name="Picture 5">
+            <a:extLst>
+              <a:ext uri="{FF2B5EF4-FFF2-40B4-BE49-F238E27FC236}">
+                <a16:creationId xmlns:a16="http://schemas.microsoft.com/office/drawing/2014/main" id="{45B4D046-A958-A404-3763-CFFE8F6EC23D}"/>
+              </a:ext>
+            </a:extLst>
+          </p:cNvPr>
+          <p:cNvPicPr>
+            <a:picLocks noChangeAspect="1"/>
+          </p:cNvPicPr>
+          <p:nvPr/>
+        </p:nvPicPr>
+        <p:blipFill>
+          <a:blip r:embed="rId5"/>
+          <a:stretch>
+            <a:fillRect/>
+          </a:stretch>
+        </p:blipFill>
+        <p:spPr>
+          <a:xfrm>
+            <a:off x="8310564" y="3376851"/>
+            <a:ext cx="3209994" cy="3322315"/>
           </a:xfrm>
           <a:prstGeom prst="rect">
             <a:avLst/>

</xml_diff>